<commit_message>
Fix USB and Quiz
</commit_message>
<xml_diff>
--- a/事故紹介.pptx
+++ b/事故紹介.pptx
@@ -2,19 +2,19 @@
 <file path=ppt/presentation.xml><?xml version="1.0" encoding="utf-8"?>
 <p:presentation xmlns:a="http://schemas.openxmlformats.org/drawingml/2006/main" xmlns:r="http://schemas.openxmlformats.org/officeDocument/2006/relationships" xmlns:p="http://schemas.openxmlformats.org/presentationml/2006/main" saveSubsetFonts="1">
   <p:sldMasterIdLst>
-    <p:sldMasterId id="2147483648" r:id="rId1"/>
+    <p:sldMasterId id="2147483660" r:id="rId1"/>
   </p:sldMasterIdLst>
   <p:sldIdLst>
     <p:sldId id="256" r:id="rId2"/>
   </p:sldIdLst>
-  <p:sldSz cx="12192000" cy="6858000"/>
+  <p:sldSz cx="9906000" cy="6858000" type="A4"/>
   <p:notesSz cx="6858000" cy="9144000"/>
   <p:defaultTextStyle>
     <a:defPPr>
-      <a:defRPr lang="ja-JP"/>
+      <a:defRPr lang="en-US"/>
     </a:defPPr>
-    <a:lvl1pPr marL="0" algn="l" defTabSz="914400" rtl="0" eaLnBrk="1" latinLnBrk="0" hangingPunct="1">
-      <a:defRPr kumimoji="1" sz="1800" kern="1200">
+    <a:lvl1pPr marL="0" algn="l" defTabSz="457200" rtl="0" eaLnBrk="1" latinLnBrk="0" hangingPunct="1">
+      <a:defRPr sz="1800" kern="1200">
         <a:solidFill>
           <a:schemeClr val="tx1"/>
         </a:solidFill>
@@ -23,8 +23,8 @@
         <a:cs typeface="+mn-cs"/>
       </a:defRPr>
     </a:lvl1pPr>
-    <a:lvl2pPr marL="457200" algn="l" defTabSz="914400" rtl="0" eaLnBrk="1" latinLnBrk="0" hangingPunct="1">
-      <a:defRPr kumimoji="1" sz="1800" kern="1200">
+    <a:lvl2pPr marL="457200" algn="l" defTabSz="457200" rtl="0" eaLnBrk="1" latinLnBrk="0" hangingPunct="1">
+      <a:defRPr sz="1800" kern="1200">
         <a:solidFill>
           <a:schemeClr val="tx1"/>
         </a:solidFill>
@@ -33,8 +33,8 @@
         <a:cs typeface="+mn-cs"/>
       </a:defRPr>
     </a:lvl2pPr>
-    <a:lvl3pPr marL="914400" algn="l" defTabSz="914400" rtl="0" eaLnBrk="1" latinLnBrk="0" hangingPunct="1">
-      <a:defRPr kumimoji="1" sz="1800" kern="1200">
+    <a:lvl3pPr marL="914400" algn="l" defTabSz="457200" rtl="0" eaLnBrk="1" latinLnBrk="0" hangingPunct="1">
+      <a:defRPr sz="1800" kern="1200">
         <a:solidFill>
           <a:schemeClr val="tx1"/>
         </a:solidFill>
@@ -43,8 +43,8 @@
         <a:cs typeface="+mn-cs"/>
       </a:defRPr>
     </a:lvl3pPr>
-    <a:lvl4pPr marL="1371600" algn="l" defTabSz="914400" rtl="0" eaLnBrk="1" latinLnBrk="0" hangingPunct="1">
-      <a:defRPr kumimoji="1" sz="1800" kern="1200">
+    <a:lvl4pPr marL="1371600" algn="l" defTabSz="457200" rtl="0" eaLnBrk="1" latinLnBrk="0" hangingPunct="1">
+      <a:defRPr sz="1800" kern="1200">
         <a:solidFill>
           <a:schemeClr val="tx1"/>
         </a:solidFill>
@@ -53,8 +53,8 @@
         <a:cs typeface="+mn-cs"/>
       </a:defRPr>
     </a:lvl4pPr>
-    <a:lvl5pPr marL="1828800" algn="l" defTabSz="914400" rtl="0" eaLnBrk="1" latinLnBrk="0" hangingPunct="1">
-      <a:defRPr kumimoji="1" sz="1800" kern="1200">
+    <a:lvl5pPr marL="1828800" algn="l" defTabSz="457200" rtl="0" eaLnBrk="1" latinLnBrk="0" hangingPunct="1">
+      <a:defRPr sz="1800" kern="1200">
         <a:solidFill>
           <a:schemeClr val="tx1"/>
         </a:solidFill>
@@ -63,8 +63,8 @@
         <a:cs typeface="+mn-cs"/>
       </a:defRPr>
     </a:lvl5pPr>
-    <a:lvl6pPr marL="2286000" algn="l" defTabSz="914400" rtl="0" eaLnBrk="1" latinLnBrk="0" hangingPunct="1">
-      <a:defRPr kumimoji="1" sz="1800" kern="1200">
+    <a:lvl6pPr marL="2286000" algn="l" defTabSz="457200" rtl="0" eaLnBrk="1" latinLnBrk="0" hangingPunct="1">
+      <a:defRPr sz="1800" kern="1200">
         <a:solidFill>
           <a:schemeClr val="tx1"/>
         </a:solidFill>
@@ -73,8 +73,8 @@
         <a:cs typeface="+mn-cs"/>
       </a:defRPr>
     </a:lvl6pPr>
-    <a:lvl7pPr marL="2743200" algn="l" defTabSz="914400" rtl="0" eaLnBrk="1" latinLnBrk="0" hangingPunct="1">
-      <a:defRPr kumimoji="1" sz="1800" kern="1200">
+    <a:lvl7pPr marL="2743200" algn="l" defTabSz="457200" rtl="0" eaLnBrk="1" latinLnBrk="0" hangingPunct="1">
+      <a:defRPr sz="1800" kern="1200">
         <a:solidFill>
           <a:schemeClr val="tx1"/>
         </a:solidFill>
@@ -83,8 +83,8 @@
         <a:cs typeface="+mn-cs"/>
       </a:defRPr>
     </a:lvl7pPr>
-    <a:lvl8pPr marL="3200400" algn="l" defTabSz="914400" rtl="0" eaLnBrk="1" latinLnBrk="0" hangingPunct="1">
-      <a:defRPr kumimoji="1" sz="1800" kern="1200">
+    <a:lvl8pPr marL="3200400" algn="l" defTabSz="457200" rtl="0" eaLnBrk="1" latinLnBrk="0" hangingPunct="1">
+      <a:defRPr sz="1800" kern="1200">
         <a:solidFill>
           <a:schemeClr val="tx1"/>
         </a:solidFill>
@@ -93,8 +93,8 @@
         <a:cs typeface="+mn-cs"/>
       </a:defRPr>
     </a:lvl8pPr>
-    <a:lvl9pPr marL="3657600" algn="l" defTabSz="914400" rtl="0" eaLnBrk="1" latinLnBrk="0" hangingPunct="1">
-      <a:defRPr kumimoji="1" sz="1800" kern="1200">
+    <a:lvl9pPr marL="3657600" algn="l" defTabSz="457200" rtl="0" eaLnBrk="1" latinLnBrk="0" hangingPunct="1">
+      <a:defRPr sz="1800" kern="1200">
         <a:solidFill>
           <a:schemeClr val="tx1"/>
         </a:solidFill>
@@ -104,12 +104,25 @@
       </a:defRPr>
     </a:lvl9pPr>
   </p:defaultTextStyle>
+  <p:extLst>
+    <p:ext uri="{EFAFB233-063F-42B5-8137-9DF3F51BA10A}">
+      <p15:sldGuideLst xmlns:p15="http://schemas.microsoft.com/office/powerpoint/2012/main"/>
+    </p:ext>
+  </p:extLst>
 </p:presentation>
 </file>
 
 <file path=ppt/slideLayouts/slideLayout1.xml><?xml version="1.0" encoding="utf-8"?>
 <p:sldLayout xmlns:a="http://schemas.openxmlformats.org/drawingml/2006/main" xmlns:r="http://schemas.openxmlformats.org/officeDocument/2006/relationships" xmlns:p="http://schemas.openxmlformats.org/presentationml/2006/main" type="title" preserve="1">
   <p:cSld name="タイトル スライド">
+    <p:bg>
+      <p:bgPr>
+        <a:solidFill>
+          <a:srgbClr val="00FF00"/>
+        </a:solidFill>
+        <a:effectLst/>
+      </p:bgPr>
+    </p:bg>
     <p:spTree>
       <p:nvGrpSpPr>
         <p:cNvPr id="1" name=""/>
@@ -126,13 +139,7 @@
       </p:grpSpPr>
       <p:sp>
         <p:nvSpPr>
-          <p:cNvPr id="2" name="タイトル 1">
-            <a:extLst>
-              <a:ext uri="{FF2B5EF4-FFF2-40B4-BE49-F238E27FC236}">
-                <a16:creationId xmlns:a16="http://schemas.microsoft.com/office/drawing/2014/main" id="{53C13D10-BBE6-B441-82B3-9181C5E27A25}"/>
-              </a:ext>
-            </a:extLst>
-          </p:cNvPr>
+          <p:cNvPr id="2" name="Title 1"/>
           <p:cNvSpPr>
             <a:spLocks noGrp="1"/>
           </p:cNvSpPr>
@@ -142,8 +149,8 @@
         </p:nvSpPr>
         <p:spPr>
           <a:xfrm>
-            <a:off x="1524000" y="1122363"/>
-            <a:ext cx="9144000" cy="2387600"/>
+            <a:off x="742950" y="1122363"/>
+            <a:ext cx="8420100" cy="2387600"/>
           </a:xfrm>
         </p:spPr>
         <p:txBody>
@@ -155,21 +162,16 @@
           </a:lstStyle>
           <a:p>
             <a:r>
-              <a:rPr kumimoji="1" lang="ja-JP" altLang="en-US"/>
+              <a:rPr lang="ja-JP" altLang="en-US"/>
               <a:t>マスター タイトルの書式設定</a:t>
             </a:r>
-          </a:p>
-        </p:txBody>
-      </p:sp>
-      <p:sp>
-        <p:nvSpPr>
-          <p:cNvPr id="3" name="字幕 2">
-            <a:extLst>
-              <a:ext uri="{FF2B5EF4-FFF2-40B4-BE49-F238E27FC236}">
-                <a16:creationId xmlns:a16="http://schemas.microsoft.com/office/drawing/2014/main" id="{178E7681-D603-02E0-8D6E-0F065E558DEF}"/>
-              </a:ext>
-            </a:extLst>
-          </p:cNvPr>
+            <a:endParaRPr lang="en-US" dirty="0"/>
+          </a:p>
+        </p:txBody>
+      </p:sp>
+      <p:sp>
+        <p:nvSpPr>
+          <p:cNvPr id="3" name="Subtitle 2"/>
           <p:cNvSpPr>
             <a:spLocks noGrp="1"/>
           </p:cNvSpPr>
@@ -179,8 +181,8 @@
         </p:nvSpPr>
         <p:spPr>
           <a:xfrm>
-            <a:off x="1524000" y="3602038"/>
-            <a:ext cx="9144000" cy="1655762"/>
+            <a:off x="1238250" y="3602038"/>
+            <a:ext cx="7429500" cy="1655762"/>
           </a:xfrm>
         </p:spPr>
         <p:txBody>
@@ -225,21 +227,16 @@
           </a:lstStyle>
           <a:p>
             <a:r>
-              <a:rPr kumimoji="1" lang="ja-JP" altLang="en-US"/>
+              <a:rPr lang="ja-JP" altLang="en-US"/>
               <a:t>マスター サブタイトルの書式設定</a:t>
             </a:r>
-          </a:p>
-        </p:txBody>
-      </p:sp>
-      <p:sp>
-        <p:nvSpPr>
-          <p:cNvPr id="4" name="日付プレースホルダー 3">
-            <a:extLst>
-              <a:ext uri="{FF2B5EF4-FFF2-40B4-BE49-F238E27FC236}">
-                <a16:creationId xmlns:a16="http://schemas.microsoft.com/office/drawing/2014/main" id="{264E78FE-D359-BB95-A6AA-DD1F924CE426}"/>
-              </a:ext>
-            </a:extLst>
-          </p:cNvPr>
+            <a:endParaRPr lang="en-US" dirty="0"/>
+          </a:p>
+        </p:txBody>
+      </p:sp>
+      <p:sp>
+        <p:nvSpPr>
+          <p:cNvPr id="4" name="Date Placeholder 3"/>
           <p:cNvSpPr>
             <a:spLocks noGrp="1"/>
           </p:cNvSpPr>
@@ -254,7 +251,7 @@
           <a:p>
             <a:fld id="{DB63C96E-B3B7-45DC-B917-3CA8BDCF5939}" type="datetimeFigureOut">
               <a:rPr kumimoji="1" lang="ja-JP" altLang="en-US" smtClean="0"/>
-              <a:t>2025/2/18</a:t>
+              <a:t>2025/2/24</a:t>
             </a:fld>
             <a:endParaRPr kumimoji="1" lang="ja-JP" altLang="en-US"/>
           </a:p>
@@ -262,13 +259,7 @@
       </p:sp>
       <p:sp>
         <p:nvSpPr>
-          <p:cNvPr id="5" name="フッター プレースホルダー 4">
-            <a:extLst>
-              <a:ext uri="{FF2B5EF4-FFF2-40B4-BE49-F238E27FC236}">
-                <a16:creationId xmlns:a16="http://schemas.microsoft.com/office/drawing/2014/main" id="{9E5D8900-51B9-61AD-57B3-2FFC8EA2C7C9}"/>
-              </a:ext>
-            </a:extLst>
-          </p:cNvPr>
+          <p:cNvPr id="5" name="Footer Placeholder 4"/>
           <p:cNvSpPr>
             <a:spLocks noGrp="1"/>
           </p:cNvSpPr>
@@ -287,13 +278,7 @@
       </p:sp>
       <p:sp>
         <p:nvSpPr>
-          <p:cNvPr id="6" name="スライド番号プレースホルダー 5">
-            <a:extLst>
-              <a:ext uri="{FF2B5EF4-FFF2-40B4-BE49-F238E27FC236}">
-                <a16:creationId xmlns:a16="http://schemas.microsoft.com/office/drawing/2014/main" id="{45DF9DEE-09AE-95D9-EB2F-D299B21B0875}"/>
-              </a:ext>
-            </a:extLst>
-          </p:cNvPr>
+          <p:cNvPr id="6" name="Slide Number Placeholder 5"/>
           <p:cNvSpPr>
             <a:spLocks noGrp="1"/>
           </p:cNvSpPr>
@@ -317,7 +302,7 @@
     </p:spTree>
     <p:extLst>
       <p:ext uri="{BB962C8B-B14F-4D97-AF65-F5344CB8AC3E}">
-        <p14:creationId xmlns:p14="http://schemas.microsoft.com/office/powerpoint/2010/main" val="583332415"/>
+        <p14:creationId xmlns:p14="http://schemas.microsoft.com/office/powerpoint/2010/main" val="2187312984"/>
       </p:ext>
     </p:extLst>
   </p:cSld>
@@ -346,13 +331,7 @@
       </p:grpSpPr>
       <p:sp>
         <p:nvSpPr>
-          <p:cNvPr id="2" name="タイトル 1">
-            <a:extLst>
-              <a:ext uri="{FF2B5EF4-FFF2-40B4-BE49-F238E27FC236}">
-                <a16:creationId xmlns:a16="http://schemas.microsoft.com/office/drawing/2014/main" id="{4B928925-A365-2F13-5649-56812BCFC82A}"/>
-              </a:ext>
-            </a:extLst>
-          </p:cNvPr>
+          <p:cNvPr id="2" name="Title 1"/>
           <p:cNvSpPr>
             <a:spLocks noGrp="1"/>
           </p:cNvSpPr>
@@ -366,21 +345,16 @@
           <a:lstStyle/>
           <a:p>
             <a:r>
-              <a:rPr kumimoji="1" lang="ja-JP" altLang="en-US"/>
+              <a:rPr lang="ja-JP" altLang="en-US"/>
               <a:t>マスター タイトルの書式設定</a:t>
             </a:r>
-          </a:p>
-        </p:txBody>
-      </p:sp>
-      <p:sp>
-        <p:nvSpPr>
-          <p:cNvPr id="3" name="縦書きテキスト プレースホルダー 2">
-            <a:extLst>
-              <a:ext uri="{FF2B5EF4-FFF2-40B4-BE49-F238E27FC236}">
-                <a16:creationId xmlns:a16="http://schemas.microsoft.com/office/drawing/2014/main" id="{96C854D0-49A0-233A-E1F0-D82B031E65CA}"/>
-              </a:ext>
-            </a:extLst>
-          </p:cNvPr>
+            <a:endParaRPr lang="en-US" dirty="0"/>
+          </a:p>
+        </p:txBody>
+      </p:sp>
+      <p:sp>
+        <p:nvSpPr>
+          <p:cNvPr id="3" name="Vertical Text Placeholder 2"/>
           <p:cNvSpPr>
             <a:spLocks noGrp="1"/>
           </p:cNvSpPr>
@@ -395,81 +369,76 @@
           <a:p>
             <a:pPr lvl="0"/>
             <a:r>
-              <a:rPr kumimoji="1" lang="ja-JP" altLang="en-US"/>
+              <a:rPr lang="ja-JP" altLang="en-US"/>
               <a:t>マスター テキストの書式設定</a:t>
             </a:r>
           </a:p>
           <a:p>
             <a:pPr lvl="1"/>
             <a:r>
-              <a:rPr kumimoji="1" lang="ja-JP" altLang="en-US"/>
+              <a:rPr lang="ja-JP" altLang="en-US"/>
               <a:t>第 </a:t>
             </a:r>
             <a:r>
-              <a:rPr kumimoji="1" lang="en-US" altLang="ja-JP"/>
+              <a:rPr lang="en-US" altLang="ja-JP"/>
               <a:t>2 </a:t>
             </a:r>
             <a:r>
-              <a:rPr kumimoji="1" lang="ja-JP" altLang="en-US"/>
+              <a:rPr lang="ja-JP" altLang="en-US"/>
               <a:t>レベル</a:t>
             </a:r>
           </a:p>
           <a:p>
             <a:pPr lvl="2"/>
             <a:r>
-              <a:rPr kumimoji="1" lang="ja-JP" altLang="en-US"/>
+              <a:rPr lang="ja-JP" altLang="en-US"/>
               <a:t>第 </a:t>
             </a:r>
             <a:r>
-              <a:rPr kumimoji="1" lang="en-US" altLang="ja-JP"/>
+              <a:rPr lang="en-US" altLang="ja-JP"/>
               <a:t>3 </a:t>
             </a:r>
             <a:r>
-              <a:rPr kumimoji="1" lang="ja-JP" altLang="en-US"/>
+              <a:rPr lang="ja-JP" altLang="en-US"/>
               <a:t>レベル</a:t>
             </a:r>
           </a:p>
           <a:p>
             <a:pPr lvl="3"/>
             <a:r>
-              <a:rPr kumimoji="1" lang="ja-JP" altLang="en-US"/>
+              <a:rPr lang="ja-JP" altLang="en-US"/>
               <a:t>第 </a:t>
             </a:r>
             <a:r>
-              <a:rPr kumimoji="1" lang="en-US" altLang="ja-JP"/>
+              <a:rPr lang="en-US" altLang="ja-JP"/>
               <a:t>4 </a:t>
             </a:r>
             <a:r>
-              <a:rPr kumimoji="1" lang="ja-JP" altLang="en-US"/>
+              <a:rPr lang="ja-JP" altLang="en-US"/>
               <a:t>レベル</a:t>
             </a:r>
           </a:p>
           <a:p>
             <a:pPr lvl="4"/>
             <a:r>
-              <a:rPr kumimoji="1" lang="ja-JP" altLang="en-US"/>
+              <a:rPr lang="ja-JP" altLang="en-US"/>
               <a:t>第 </a:t>
             </a:r>
             <a:r>
-              <a:rPr kumimoji="1" lang="en-US" altLang="ja-JP"/>
+              <a:rPr lang="en-US" altLang="ja-JP"/>
               <a:t>5 </a:t>
             </a:r>
             <a:r>
-              <a:rPr kumimoji="1" lang="ja-JP" altLang="en-US"/>
+              <a:rPr lang="ja-JP" altLang="en-US"/>
               <a:t>レベル</a:t>
             </a:r>
-          </a:p>
-        </p:txBody>
-      </p:sp>
-      <p:sp>
-        <p:nvSpPr>
-          <p:cNvPr id="4" name="日付プレースホルダー 3">
-            <a:extLst>
-              <a:ext uri="{FF2B5EF4-FFF2-40B4-BE49-F238E27FC236}">
-                <a16:creationId xmlns:a16="http://schemas.microsoft.com/office/drawing/2014/main" id="{CBB9D3F0-04A8-7C3B-8A0B-B2AE43A6B2A5}"/>
-              </a:ext>
-            </a:extLst>
-          </p:cNvPr>
+            <a:endParaRPr lang="en-US" dirty="0"/>
+          </a:p>
+        </p:txBody>
+      </p:sp>
+      <p:sp>
+        <p:nvSpPr>
+          <p:cNvPr id="4" name="Date Placeholder 3"/>
           <p:cNvSpPr>
             <a:spLocks noGrp="1"/>
           </p:cNvSpPr>
@@ -484,7 +453,7 @@
           <a:p>
             <a:fld id="{DB63C96E-B3B7-45DC-B917-3CA8BDCF5939}" type="datetimeFigureOut">
               <a:rPr kumimoji="1" lang="ja-JP" altLang="en-US" smtClean="0"/>
-              <a:t>2025/2/18</a:t>
+              <a:t>2025/2/24</a:t>
             </a:fld>
             <a:endParaRPr kumimoji="1" lang="ja-JP" altLang="en-US"/>
           </a:p>
@@ -492,13 +461,7 @@
       </p:sp>
       <p:sp>
         <p:nvSpPr>
-          <p:cNvPr id="5" name="フッター プレースホルダー 4">
-            <a:extLst>
-              <a:ext uri="{FF2B5EF4-FFF2-40B4-BE49-F238E27FC236}">
-                <a16:creationId xmlns:a16="http://schemas.microsoft.com/office/drawing/2014/main" id="{E59B391B-5FF5-D87B-5606-B69861017B7B}"/>
-              </a:ext>
-            </a:extLst>
-          </p:cNvPr>
+          <p:cNvPr id="5" name="Footer Placeholder 4"/>
           <p:cNvSpPr>
             <a:spLocks noGrp="1"/>
           </p:cNvSpPr>
@@ -517,13 +480,7 @@
       </p:sp>
       <p:sp>
         <p:nvSpPr>
-          <p:cNvPr id="6" name="スライド番号プレースホルダー 5">
-            <a:extLst>
-              <a:ext uri="{FF2B5EF4-FFF2-40B4-BE49-F238E27FC236}">
-                <a16:creationId xmlns:a16="http://schemas.microsoft.com/office/drawing/2014/main" id="{8C2FA4C3-5CD5-C7F1-6C21-6B007E8F5338}"/>
-              </a:ext>
-            </a:extLst>
-          </p:cNvPr>
+          <p:cNvPr id="6" name="Slide Number Placeholder 5"/>
           <p:cNvSpPr>
             <a:spLocks noGrp="1"/>
           </p:cNvSpPr>
@@ -547,7 +504,7 @@
     </p:spTree>
     <p:extLst>
       <p:ext uri="{BB962C8B-B14F-4D97-AF65-F5344CB8AC3E}">
-        <p14:creationId xmlns:p14="http://schemas.microsoft.com/office/powerpoint/2010/main" val="784416587"/>
+        <p14:creationId xmlns:p14="http://schemas.microsoft.com/office/powerpoint/2010/main" val="4041587419"/>
       </p:ext>
     </p:extLst>
   </p:cSld>
@@ -576,13 +533,7 @@
       </p:grpSpPr>
       <p:sp>
         <p:nvSpPr>
-          <p:cNvPr id="2" name="縦書きタイトル 1">
-            <a:extLst>
-              <a:ext uri="{FF2B5EF4-FFF2-40B4-BE49-F238E27FC236}">
-                <a16:creationId xmlns:a16="http://schemas.microsoft.com/office/drawing/2014/main" id="{DDFA07C0-D8E3-CF56-C57A-2E5441DF26D5}"/>
-              </a:ext>
-            </a:extLst>
-          </p:cNvPr>
+          <p:cNvPr id="2" name="Vertical Title 1"/>
           <p:cNvSpPr>
             <a:spLocks noGrp="1"/>
           </p:cNvSpPr>
@@ -592,8 +543,8 @@
         </p:nvSpPr>
         <p:spPr>
           <a:xfrm>
-            <a:off x="8724900" y="365125"/>
-            <a:ext cx="2628900" cy="5811838"/>
+            <a:off x="7088982" y="365125"/>
+            <a:ext cx="2135981" cy="5811838"/>
           </a:xfrm>
         </p:spPr>
         <p:txBody>
@@ -601,21 +552,16 @@
           <a:lstStyle/>
           <a:p>
             <a:r>
-              <a:rPr kumimoji="1" lang="ja-JP" altLang="en-US"/>
+              <a:rPr lang="ja-JP" altLang="en-US"/>
               <a:t>マスター タイトルの書式設定</a:t>
             </a:r>
-          </a:p>
-        </p:txBody>
-      </p:sp>
-      <p:sp>
-        <p:nvSpPr>
-          <p:cNvPr id="3" name="縦書きテキスト プレースホルダー 2">
-            <a:extLst>
-              <a:ext uri="{FF2B5EF4-FFF2-40B4-BE49-F238E27FC236}">
-                <a16:creationId xmlns:a16="http://schemas.microsoft.com/office/drawing/2014/main" id="{6FC92D8D-EFD2-0987-07DC-E32D87B3C384}"/>
-              </a:ext>
-            </a:extLst>
-          </p:cNvPr>
+            <a:endParaRPr lang="en-US" dirty="0"/>
+          </a:p>
+        </p:txBody>
+      </p:sp>
+      <p:sp>
+        <p:nvSpPr>
+          <p:cNvPr id="3" name="Vertical Text Placeholder 2"/>
           <p:cNvSpPr>
             <a:spLocks noGrp="1"/>
           </p:cNvSpPr>
@@ -625,8 +571,8 @@
         </p:nvSpPr>
         <p:spPr>
           <a:xfrm>
-            <a:off x="838200" y="365125"/>
-            <a:ext cx="7734300" cy="5811838"/>
+            <a:off x="681038" y="365125"/>
+            <a:ext cx="6284119" cy="5811838"/>
           </a:xfrm>
         </p:spPr>
         <p:txBody>
@@ -635,81 +581,76 @@
           <a:p>
             <a:pPr lvl="0"/>
             <a:r>
-              <a:rPr kumimoji="1" lang="ja-JP" altLang="en-US"/>
+              <a:rPr lang="ja-JP" altLang="en-US"/>
               <a:t>マスター テキストの書式設定</a:t>
             </a:r>
           </a:p>
           <a:p>
             <a:pPr lvl="1"/>
             <a:r>
-              <a:rPr kumimoji="1" lang="ja-JP" altLang="en-US"/>
+              <a:rPr lang="ja-JP" altLang="en-US"/>
               <a:t>第 </a:t>
             </a:r>
             <a:r>
-              <a:rPr kumimoji="1" lang="en-US" altLang="ja-JP"/>
+              <a:rPr lang="en-US" altLang="ja-JP"/>
               <a:t>2 </a:t>
             </a:r>
             <a:r>
-              <a:rPr kumimoji="1" lang="ja-JP" altLang="en-US"/>
+              <a:rPr lang="ja-JP" altLang="en-US"/>
               <a:t>レベル</a:t>
             </a:r>
           </a:p>
           <a:p>
             <a:pPr lvl="2"/>
             <a:r>
-              <a:rPr kumimoji="1" lang="ja-JP" altLang="en-US"/>
+              <a:rPr lang="ja-JP" altLang="en-US"/>
               <a:t>第 </a:t>
             </a:r>
             <a:r>
-              <a:rPr kumimoji="1" lang="en-US" altLang="ja-JP"/>
+              <a:rPr lang="en-US" altLang="ja-JP"/>
               <a:t>3 </a:t>
             </a:r>
             <a:r>
-              <a:rPr kumimoji="1" lang="ja-JP" altLang="en-US"/>
+              <a:rPr lang="ja-JP" altLang="en-US"/>
               <a:t>レベル</a:t>
             </a:r>
           </a:p>
           <a:p>
             <a:pPr lvl="3"/>
             <a:r>
-              <a:rPr kumimoji="1" lang="ja-JP" altLang="en-US"/>
+              <a:rPr lang="ja-JP" altLang="en-US"/>
               <a:t>第 </a:t>
             </a:r>
             <a:r>
-              <a:rPr kumimoji="1" lang="en-US" altLang="ja-JP"/>
+              <a:rPr lang="en-US" altLang="ja-JP"/>
               <a:t>4 </a:t>
             </a:r>
             <a:r>
-              <a:rPr kumimoji="1" lang="ja-JP" altLang="en-US"/>
+              <a:rPr lang="ja-JP" altLang="en-US"/>
               <a:t>レベル</a:t>
             </a:r>
           </a:p>
           <a:p>
             <a:pPr lvl="4"/>
             <a:r>
-              <a:rPr kumimoji="1" lang="ja-JP" altLang="en-US"/>
+              <a:rPr lang="ja-JP" altLang="en-US"/>
               <a:t>第 </a:t>
             </a:r>
             <a:r>
-              <a:rPr kumimoji="1" lang="en-US" altLang="ja-JP"/>
+              <a:rPr lang="en-US" altLang="ja-JP"/>
               <a:t>5 </a:t>
             </a:r>
             <a:r>
-              <a:rPr kumimoji="1" lang="ja-JP" altLang="en-US"/>
+              <a:rPr lang="ja-JP" altLang="en-US"/>
               <a:t>レベル</a:t>
             </a:r>
-          </a:p>
-        </p:txBody>
-      </p:sp>
-      <p:sp>
-        <p:nvSpPr>
-          <p:cNvPr id="4" name="日付プレースホルダー 3">
-            <a:extLst>
-              <a:ext uri="{FF2B5EF4-FFF2-40B4-BE49-F238E27FC236}">
-                <a16:creationId xmlns:a16="http://schemas.microsoft.com/office/drawing/2014/main" id="{319A3964-0A24-6220-8FAE-D4DDB8F7008D}"/>
-              </a:ext>
-            </a:extLst>
-          </p:cNvPr>
+            <a:endParaRPr lang="en-US" dirty="0"/>
+          </a:p>
+        </p:txBody>
+      </p:sp>
+      <p:sp>
+        <p:nvSpPr>
+          <p:cNvPr id="4" name="Date Placeholder 3"/>
           <p:cNvSpPr>
             <a:spLocks noGrp="1"/>
           </p:cNvSpPr>
@@ -724,7 +665,7 @@
           <a:p>
             <a:fld id="{DB63C96E-B3B7-45DC-B917-3CA8BDCF5939}" type="datetimeFigureOut">
               <a:rPr kumimoji="1" lang="ja-JP" altLang="en-US" smtClean="0"/>
-              <a:t>2025/2/18</a:t>
+              <a:t>2025/2/24</a:t>
             </a:fld>
             <a:endParaRPr kumimoji="1" lang="ja-JP" altLang="en-US"/>
           </a:p>
@@ -732,13 +673,7 @@
       </p:sp>
       <p:sp>
         <p:nvSpPr>
-          <p:cNvPr id="5" name="フッター プレースホルダー 4">
-            <a:extLst>
-              <a:ext uri="{FF2B5EF4-FFF2-40B4-BE49-F238E27FC236}">
-                <a16:creationId xmlns:a16="http://schemas.microsoft.com/office/drawing/2014/main" id="{E18897F8-0D75-EBAE-0A89-8F6C32B6AB03}"/>
-              </a:ext>
-            </a:extLst>
-          </p:cNvPr>
+          <p:cNvPr id="5" name="Footer Placeholder 4"/>
           <p:cNvSpPr>
             <a:spLocks noGrp="1"/>
           </p:cNvSpPr>
@@ -757,13 +692,7 @@
       </p:sp>
       <p:sp>
         <p:nvSpPr>
-          <p:cNvPr id="6" name="スライド番号プレースホルダー 5">
-            <a:extLst>
-              <a:ext uri="{FF2B5EF4-FFF2-40B4-BE49-F238E27FC236}">
-                <a16:creationId xmlns:a16="http://schemas.microsoft.com/office/drawing/2014/main" id="{FE85DB6C-9BC3-4DD9-1306-9263D7F30BF2}"/>
-              </a:ext>
-            </a:extLst>
-          </p:cNvPr>
+          <p:cNvPr id="6" name="Slide Number Placeholder 5"/>
           <p:cNvSpPr>
             <a:spLocks noGrp="1"/>
           </p:cNvSpPr>
@@ -787,7 +716,7 @@
     </p:spTree>
     <p:extLst>
       <p:ext uri="{BB962C8B-B14F-4D97-AF65-F5344CB8AC3E}">
-        <p14:creationId xmlns:p14="http://schemas.microsoft.com/office/powerpoint/2010/main" val="3011565505"/>
+        <p14:creationId xmlns:p14="http://schemas.microsoft.com/office/powerpoint/2010/main" val="519948405"/>
       </p:ext>
     </p:extLst>
   </p:cSld>
@@ -816,13 +745,7 @@
       </p:grpSpPr>
       <p:sp>
         <p:nvSpPr>
-          <p:cNvPr id="2" name="タイトル 1">
-            <a:extLst>
-              <a:ext uri="{FF2B5EF4-FFF2-40B4-BE49-F238E27FC236}">
-                <a16:creationId xmlns:a16="http://schemas.microsoft.com/office/drawing/2014/main" id="{49561126-A686-0265-E098-8E975E90928B}"/>
-              </a:ext>
-            </a:extLst>
-          </p:cNvPr>
+          <p:cNvPr id="2" name="Title 1"/>
           <p:cNvSpPr>
             <a:spLocks noGrp="1"/>
           </p:cNvSpPr>
@@ -836,21 +759,16 @@
           <a:lstStyle/>
           <a:p>
             <a:r>
-              <a:rPr kumimoji="1" lang="ja-JP" altLang="en-US"/>
+              <a:rPr lang="ja-JP" altLang="en-US"/>
               <a:t>マスター タイトルの書式設定</a:t>
             </a:r>
-          </a:p>
-        </p:txBody>
-      </p:sp>
-      <p:sp>
-        <p:nvSpPr>
-          <p:cNvPr id="3" name="コンテンツ プレースホルダー 2">
-            <a:extLst>
-              <a:ext uri="{FF2B5EF4-FFF2-40B4-BE49-F238E27FC236}">
-                <a16:creationId xmlns:a16="http://schemas.microsoft.com/office/drawing/2014/main" id="{BFBE822A-47DE-DDE2-35CB-7D4C0C3165FA}"/>
-              </a:ext>
-            </a:extLst>
-          </p:cNvPr>
+            <a:endParaRPr lang="en-US" dirty="0"/>
+          </a:p>
+        </p:txBody>
+      </p:sp>
+      <p:sp>
+        <p:nvSpPr>
+          <p:cNvPr id="3" name="Content Placeholder 2"/>
           <p:cNvSpPr>
             <a:spLocks noGrp="1"/>
           </p:cNvSpPr>
@@ -865,81 +783,76 @@
           <a:p>
             <a:pPr lvl="0"/>
             <a:r>
-              <a:rPr kumimoji="1" lang="ja-JP" altLang="en-US"/>
+              <a:rPr lang="ja-JP" altLang="en-US"/>
               <a:t>マスター テキストの書式設定</a:t>
             </a:r>
           </a:p>
           <a:p>
             <a:pPr lvl="1"/>
             <a:r>
-              <a:rPr kumimoji="1" lang="ja-JP" altLang="en-US"/>
+              <a:rPr lang="ja-JP" altLang="en-US"/>
               <a:t>第 </a:t>
             </a:r>
             <a:r>
-              <a:rPr kumimoji="1" lang="en-US" altLang="ja-JP"/>
+              <a:rPr lang="en-US" altLang="ja-JP"/>
               <a:t>2 </a:t>
             </a:r>
             <a:r>
-              <a:rPr kumimoji="1" lang="ja-JP" altLang="en-US"/>
+              <a:rPr lang="ja-JP" altLang="en-US"/>
               <a:t>レベル</a:t>
             </a:r>
           </a:p>
           <a:p>
             <a:pPr lvl="2"/>
             <a:r>
-              <a:rPr kumimoji="1" lang="ja-JP" altLang="en-US"/>
+              <a:rPr lang="ja-JP" altLang="en-US"/>
               <a:t>第 </a:t>
             </a:r>
             <a:r>
-              <a:rPr kumimoji="1" lang="en-US" altLang="ja-JP"/>
+              <a:rPr lang="en-US" altLang="ja-JP"/>
               <a:t>3 </a:t>
             </a:r>
             <a:r>
-              <a:rPr kumimoji="1" lang="ja-JP" altLang="en-US"/>
+              <a:rPr lang="ja-JP" altLang="en-US"/>
               <a:t>レベル</a:t>
             </a:r>
           </a:p>
           <a:p>
             <a:pPr lvl="3"/>
             <a:r>
-              <a:rPr kumimoji="1" lang="ja-JP" altLang="en-US"/>
+              <a:rPr lang="ja-JP" altLang="en-US"/>
               <a:t>第 </a:t>
             </a:r>
             <a:r>
-              <a:rPr kumimoji="1" lang="en-US" altLang="ja-JP"/>
+              <a:rPr lang="en-US" altLang="ja-JP"/>
               <a:t>4 </a:t>
             </a:r>
             <a:r>
-              <a:rPr kumimoji="1" lang="ja-JP" altLang="en-US"/>
+              <a:rPr lang="ja-JP" altLang="en-US"/>
               <a:t>レベル</a:t>
             </a:r>
           </a:p>
           <a:p>
             <a:pPr lvl="4"/>
             <a:r>
-              <a:rPr kumimoji="1" lang="ja-JP" altLang="en-US"/>
+              <a:rPr lang="ja-JP" altLang="en-US"/>
               <a:t>第 </a:t>
             </a:r>
             <a:r>
-              <a:rPr kumimoji="1" lang="en-US" altLang="ja-JP"/>
+              <a:rPr lang="en-US" altLang="ja-JP"/>
               <a:t>5 </a:t>
             </a:r>
             <a:r>
-              <a:rPr kumimoji="1" lang="ja-JP" altLang="en-US"/>
+              <a:rPr lang="ja-JP" altLang="en-US"/>
               <a:t>レベル</a:t>
             </a:r>
-          </a:p>
-        </p:txBody>
-      </p:sp>
-      <p:sp>
-        <p:nvSpPr>
-          <p:cNvPr id="4" name="日付プレースホルダー 3">
-            <a:extLst>
-              <a:ext uri="{FF2B5EF4-FFF2-40B4-BE49-F238E27FC236}">
-                <a16:creationId xmlns:a16="http://schemas.microsoft.com/office/drawing/2014/main" id="{2428C088-DA76-3E62-BC38-E060B550CA58}"/>
-              </a:ext>
-            </a:extLst>
-          </p:cNvPr>
+            <a:endParaRPr lang="en-US" dirty="0"/>
+          </a:p>
+        </p:txBody>
+      </p:sp>
+      <p:sp>
+        <p:nvSpPr>
+          <p:cNvPr id="4" name="Date Placeholder 3"/>
           <p:cNvSpPr>
             <a:spLocks noGrp="1"/>
           </p:cNvSpPr>
@@ -954,7 +867,7 @@
           <a:p>
             <a:fld id="{DB63C96E-B3B7-45DC-B917-3CA8BDCF5939}" type="datetimeFigureOut">
               <a:rPr kumimoji="1" lang="ja-JP" altLang="en-US" smtClean="0"/>
-              <a:t>2025/2/18</a:t>
+              <a:t>2025/2/24</a:t>
             </a:fld>
             <a:endParaRPr kumimoji="1" lang="ja-JP" altLang="en-US"/>
           </a:p>
@@ -962,13 +875,7 @@
       </p:sp>
       <p:sp>
         <p:nvSpPr>
-          <p:cNvPr id="5" name="フッター プレースホルダー 4">
-            <a:extLst>
-              <a:ext uri="{FF2B5EF4-FFF2-40B4-BE49-F238E27FC236}">
-                <a16:creationId xmlns:a16="http://schemas.microsoft.com/office/drawing/2014/main" id="{B54CDE3B-C396-8102-0E30-10F8078DC7D8}"/>
-              </a:ext>
-            </a:extLst>
-          </p:cNvPr>
+          <p:cNvPr id="5" name="Footer Placeholder 4"/>
           <p:cNvSpPr>
             <a:spLocks noGrp="1"/>
           </p:cNvSpPr>
@@ -987,13 +894,7 @@
       </p:sp>
       <p:sp>
         <p:nvSpPr>
-          <p:cNvPr id="6" name="スライド番号プレースホルダー 5">
-            <a:extLst>
-              <a:ext uri="{FF2B5EF4-FFF2-40B4-BE49-F238E27FC236}">
-                <a16:creationId xmlns:a16="http://schemas.microsoft.com/office/drawing/2014/main" id="{61368D90-84AD-8B43-9C2E-CC061D83C2BC}"/>
-              </a:ext>
-            </a:extLst>
-          </p:cNvPr>
+          <p:cNvPr id="6" name="Slide Number Placeholder 5"/>
           <p:cNvSpPr>
             <a:spLocks noGrp="1"/>
           </p:cNvSpPr>
@@ -1017,7 +918,7 @@
     </p:spTree>
     <p:extLst>
       <p:ext uri="{BB962C8B-B14F-4D97-AF65-F5344CB8AC3E}">
-        <p14:creationId xmlns:p14="http://schemas.microsoft.com/office/powerpoint/2010/main" val="3028668293"/>
+        <p14:creationId xmlns:p14="http://schemas.microsoft.com/office/powerpoint/2010/main" val="1690931452"/>
       </p:ext>
     </p:extLst>
   </p:cSld>
@@ -1046,13 +947,7 @@
       </p:grpSpPr>
       <p:sp>
         <p:nvSpPr>
-          <p:cNvPr id="2" name="タイトル 1">
-            <a:extLst>
-              <a:ext uri="{FF2B5EF4-FFF2-40B4-BE49-F238E27FC236}">
-                <a16:creationId xmlns:a16="http://schemas.microsoft.com/office/drawing/2014/main" id="{B30E8C15-6839-4A9A-5A70-4BDDBAAD8C82}"/>
-              </a:ext>
-            </a:extLst>
-          </p:cNvPr>
+          <p:cNvPr id="2" name="Title 1"/>
           <p:cNvSpPr>
             <a:spLocks noGrp="1"/>
           </p:cNvSpPr>
@@ -1062,8 +957,8 @@
         </p:nvSpPr>
         <p:spPr>
           <a:xfrm>
-            <a:off x="831850" y="1709738"/>
-            <a:ext cx="10515600" cy="2852737"/>
+            <a:off x="675879" y="1709740"/>
+            <a:ext cx="8543925" cy="2852737"/>
           </a:xfrm>
         </p:spPr>
         <p:txBody>
@@ -1075,21 +970,16 @@
           </a:lstStyle>
           <a:p>
             <a:r>
-              <a:rPr kumimoji="1" lang="ja-JP" altLang="en-US"/>
+              <a:rPr lang="ja-JP" altLang="en-US"/>
               <a:t>マスター タイトルの書式設定</a:t>
             </a:r>
-          </a:p>
-        </p:txBody>
-      </p:sp>
-      <p:sp>
-        <p:nvSpPr>
-          <p:cNvPr id="3" name="テキスト プレースホルダー 2">
-            <a:extLst>
-              <a:ext uri="{FF2B5EF4-FFF2-40B4-BE49-F238E27FC236}">
-                <a16:creationId xmlns:a16="http://schemas.microsoft.com/office/drawing/2014/main" id="{91BD00EB-A669-D091-CA37-96A1EA13F458}"/>
-              </a:ext>
-            </a:extLst>
-          </p:cNvPr>
+            <a:endParaRPr lang="en-US" dirty="0"/>
+          </a:p>
+        </p:txBody>
+      </p:sp>
+      <p:sp>
+        <p:nvSpPr>
+          <p:cNvPr id="3" name="Text Placeholder 2"/>
           <p:cNvSpPr>
             <a:spLocks noGrp="1"/>
           </p:cNvSpPr>
@@ -1099,8 +989,8 @@
         </p:nvSpPr>
         <p:spPr>
           <a:xfrm>
-            <a:off x="831850" y="4589463"/>
-            <a:ext cx="10515600" cy="1500187"/>
+            <a:off x="675879" y="4589465"/>
+            <a:ext cx="8543925" cy="1500187"/>
           </a:xfrm>
         </p:spPr>
         <p:txBody>
@@ -1200,7 +1090,7 @@
           <a:p>
             <a:pPr lvl="0"/>
             <a:r>
-              <a:rPr kumimoji="1" lang="ja-JP" altLang="en-US"/>
+              <a:rPr lang="ja-JP" altLang="en-US"/>
               <a:t>マスター テキストの書式設定</a:t>
             </a:r>
           </a:p>
@@ -1208,13 +1098,7 @@
       </p:sp>
       <p:sp>
         <p:nvSpPr>
-          <p:cNvPr id="4" name="日付プレースホルダー 3">
-            <a:extLst>
-              <a:ext uri="{FF2B5EF4-FFF2-40B4-BE49-F238E27FC236}">
-                <a16:creationId xmlns:a16="http://schemas.microsoft.com/office/drawing/2014/main" id="{4B8A1F1E-4615-6576-935A-3BC60B755249}"/>
-              </a:ext>
-            </a:extLst>
-          </p:cNvPr>
+          <p:cNvPr id="4" name="Date Placeholder 3"/>
           <p:cNvSpPr>
             <a:spLocks noGrp="1"/>
           </p:cNvSpPr>
@@ -1229,7 +1113,7 @@
           <a:p>
             <a:fld id="{DB63C96E-B3B7-45DC-B917-3CA8BDCF5939}" type="datetimeFigureOut">
               <a:rPr kumimoji="1" lang="ja-JP" altLang="en-US" smtClean="0"/>
-              <a:t>2025/2/18</a:t>
+              <a:t>2025/2/24</a:t>
             </a:fld>
             <a:endParaRPr kumimoji="1" lang="ja-JP" altLang="en-US"/>
           </a:p>
@@ -1237,13 +1121,7 @@
       </p:sp>
       <p:sp>
         <p:nvSpPr>
-          <p:cNvPr id="5" name="フッター プレースホルダー 4">
-            <a:extLst>
-              <a:ext uri="{FF2B5EF4-FFF2-40B4-BE49-F238E27FC236}">
-                <a16:creationId xmlns:a16="http://schemas.microsoft.com/office/drawing/2014/main" id="{D2621336-579D-26FF-4DF2-2CBD9220BE24}"/>
-              </a:ext>
-            </a:extLst>
-          </p:cNvPr>
+          <p:cNvPr id="5" name="Footer Placeholder 4"/>
           <p:cNvSpPr>
             <a:spLocks noGrp="1"/>
           </p:cNvSpPr>
@@ -1262,13 +1140,7 @@
       </p:sp>
       <p:sp>
         <p:nvSpPr>
-          <p:cNvPr id="6" name="スライド番号プレースホルダー 5">
-            <a:extLst>
-              <a:ext uri="{FF2B5EF4-FFF2-40B4-BE49-F238E27FC236}">
-                <a16:creationId xmlns:a16="http://schemas.microsoft.com/office/drawing/2014/main" id="{399E6404-835D-45C8-4922-1A7856C1A4F3}"/>
-              </a:ext>
-            </a:extLst>
-          </p:cNvPr>
+          <p:cNvPr id="6" name="Slide Number Placeholder 5"/>
           <p:cNvSpPr>
             <a:spLocks noGrp="1"/>
           </p:cNvSpPr>
@@ -1292,7 +1164,7 @@
     </p:spTree>
     <p:extLst>
       <p:ext uri="{BB962C8B-B14F-4D97-AF65-F5344CB8AC3E}">
-        <p14:creationId xmlns:p14="http://schemas.microsoft.com/office/powerpoint/2010/main" val="1316491011"/>
+        <p14:creationId xmlns:p14="http://schemas.microsoft.com/office/powerpoint/2010/main" val="3633289365"/>
       </p:ext>
     </p:extLst>
   </p:cSld>
@@ -1321,13 +1193,7 @@
       </p:grpSpPr>
       <p:sp>
         <p:nvSpPr>
-          <p:cNvPr id="2" name="タイトル 1">
-            <a:extLst>
-              <a:ext uri="{FF2B5EF4-FFF2-40B4-BE49-F238E27FC236}">
-                <a16:creationId xmlns:a16="http://schemas.microsoft.com/office/drawing/2014/main" id="{614D9257-F920-6E38-5684-07689777349C}"/>
-              </a:ext>
-            </a:extLst>
-          </p:cNvPr>
+          <p:cNvPr id="2" name="Title 1"/>
           <p:cNvSpPr>
             <a:spLocks noGrp="1"/>
           </p:cNvSpPr>
@@ -1341,21 +1207,16 @@
           <a:lstStyle/>
           <a:p>
             <a:r>
-              <a:rPr kumimoji="1" lang="ja-JP" altLang="en-US"/>
+              <a:rPr lang="ja-JP" altLang="en-US"/>
               <a:t>マスター タイトルの書式設定</a:t>
             </a:r>
-          </a:p>
-        </p:txBody>
-      </p:sp>
-      <p:sp>
-        <p:nvSpPr>
-          <p:cNvPr id="3" name="コンテンツ プレースホルダー 2">
-            <a:extLst>
-              <a:ext uri="{FF2B5EF4-FFF2-40B4-BE49-F238E27FC236}">
-                <a16:creationId xmlns:a16="http://schemas.microsoft.com/office/drawing/2014/main" id="{8A429213-867D-2B96-E853-25B731DB58EE}"/>
-              </a:ext>
-            </a:extLst>
-          </p:cNvPr>
+            <a:endParaRPr lang="en-US" dirty="0"/>
+          </a:p>
+        </p:txBody>
+      </p:sp>
+      <p:sp>
+        <p:nvSpPr>
+          <p:cNvPr id="3" name="Content Placeholder 2"/>
           <p:cNvSpPr>
             <a:spLocks noGrp="1"/>
           </p:cNvSpPr>
@@ -1365,8 +1226,8 @@
         </p:nvSpPr>
         <p:spPr>
           <a:xfrm>
-            <a:off x="838200" y="1825625"/>
-            <a:ext cx="5181600" cy="4351338"/>
+            <a:off x="681038" y="1825625"/>
+            <a:ext cx="4210050" cy="4351338"/>
           </a:xfrm>
         </p:spPr>
         <p:txBody>
@@ -1375,81 +1236,76 @@
           <a:p>
             <a:pPr lvl="0"/>
             <a:r>
-              <a:rPr kumimoji="1" lang="ja-JP" altLang="en-US"/>
+              <a:rPr lang="ja-JP" altLang="en-US"/>
               <a:t>マスター テキストの書式設定</a:t>
             </a:r>
           </a:p>
           <a:p>
             <a:pPr lvl="1"/>
             <a:r>
-              <a:rPr kumimoji="1" lang="ja-JP" altLang="en-US"/>
+              <a:rPr lang="ja-JP" altLang="en-US"/>
               <a:t>第 </a:t>
             </a:r>
             <a:r>
-              <a:rPr kumimoji="1" lang="en-US" altLang="ja-JP"/>
+              <a:rPr lang="en-US" altLang="ja-JP"/>
               <a:t>2 </a:t>
             </a:r>
             <a:r>
-              <a:rPr kumimoji="1" lang="ja-JP" altLang="en-US"/>
+              <a:rPr lang="ja-JP" altLang="en-US"/>
               <a:t>レベル</a:t>
             </a:r>
           </a:p>
           <a:p>
             <a:pPr lvl="2"/>
             <a:r>
-              <a:rPr kumimoji="1" lang="ja-JP" altLang="en-US"/>
+              <a:rPr lang="ja-JP" altLang="en-US"/>
               <a:t>第 </a:t>
             </a:r>
             <a:r>
-              <a:rPr kumimoji="1" lang="en-US" altLang="ja-JP"/>
+              <a:rPr lang="en-US" altLang="ja-JP"/>
               <a:t>3 </a:t>
             </a:r>
             <a:r>
-              <a:rPr kumimoji="1" lang="ja-JP" altLang="en-US"/>
+              <a:rPr lang="ja-JP" altLang="en-US"/>
               <a:t>レベル</a:t>
             </a:r>
           </a:p>
           <a:p>
             <a:pPr lvl="3"/>
             <a:r>
-              <a:rPr kumimoji="1" lang="ja-JP" altLang="en-US"/>
+              <a:rPr lang="ja-JP" altLang="en-US"/>
               <a:t>第 </a:t>
             </a:r>
             <a:r>
-              <a:rPr kumimoji="1" lang="en-US" altLang="ja-JP"/>
+              <a:rPr lang="en-US" altLang="ja-JP"/>
               <a:t>4 </a:t>
             </a:r>
             <a:r>
-              <a:rPr kumimoji="1" lang="ja-JP" altLang="en-US"/>
+              <a:rPr lang="ja-JP" altLang="en-US"/>
               <a:t>レベル</a:t>
             </a:r>
           </a:p>
           <a:p>
             <a:pPr lvl="4"/>
             <a:r>
-              <a:rPr kumimoji="1" lang="ja-JP" altLang="en-US"/>
+              <a:rPr lang="ja-JP" altLang="en-US"/>
               <a:t>第 </a:t>
             </a:r>
             <a:r>
-              <a:rPr kumimoji="1" lang="en-US" altLang="ja-JP"/>
+              <a:rPr lang="en-US" altLang="ja-JP"/>
               <a:t>5 </a:t>
             </a:r>
             <a:r>
-              <a:rPr kumimoji="1" lang="ja-JP" altLang="en-US"/>
+              <a:rPr lang="ja-JP" altLang="en-US"/>
               <a:t>レベル</a:t>
             </a:r>
-          </a:p>
-        </p:txBody>
-      </p:sp>
-      <p:sp>
-        <p:nvSpPr>
-          <p:cNvPr id="4" name="コンテンツ プレースホルダー 3">
-            <a:extLst>
-              <a:ext uri="{FF2B5EF4-FFF2-40B4-BE49-F238E27FC236}">
-                <a16:creationId xmlns:a16="http://schemas.microsoft.com/office/drawing/2014/main" id="{8B5A3105-C17E-14C5-E170-CC42B63E524A}"/>
-              </a:ext>
-            </a:extLst>
-          </p:cNvPr>
+            <a:endParaRPr lang="en-US" dirty="0"/>
+          </a:p>
+        </p:txBody>
+      </p:sp>
+      <p:sp>
+        <p:nvSpPr>
+          <p:cNvPr id="4" name="Content Placeholder 3"/>
           <p:cNvSpPr>
             <a:spLocks noGrp="1"/>
           </p:cNvSpPr>
@@ -1459,8 +1315,8 @@
         </p:nvSpPr>
         <p:spPr>
           <a:xfrm>
-            <a:off x="6172200" y="1825625"/>
-            <a:ext cx="5181600" cy="4351338"/>
+            <a:off x="5014913" y="1825625"/>
+            <a:ext cx="4210050" cy="4351338"/>
           </a:xfrm>
         </p:spPr>
         <p:txBody>
@@ -1469,81 +1325,76 @@
           <a:p>
             <a:pPr lvl="0"/>
             <a:r>
-              <a:rPr kumimoji="1" lang="ja-JP" altLang="en-US"/>
+              <a:rPr lang="ja-JP" altLang="en-US"/>
               <a:t>マスター テキストの書式設定</a:t>
             </a:r>
           </a:p>
           <a:p>
             <a:pPr lvl="1"/>
             <a:r>
-              <a:rPr kumimoji="1" lang="ja-JP" altLang="en-US"/>
+              <a:rPr lang="ja-JP" altLang="en-US"/>
               <a:t>第 </a:t>
             </a:r>
             <a:r>
-              <a:rPr kumimoji="1" lang="en-US" altLang="ja-JP"/>
+              <a:rPr lang="en-US" altLang="ja-JP"/>
               <a:t>2 </a:t>
             </a:r>
             <a:r>
-              <a:rPr kumimoji="1" lang="ja-JP" altLang="en-US"/>
+              <a:rPr lang="ja-JP" altLang="en-US"/>
               <a:t>レベル</a:t>
             </a:r>
           </a:p>
           <a:p>
             <a:pPr lvl="2"/>
             <a:r>
-              <a:rPr kumimoji="1" lang="ja-JP" altLang="en-US"/>
+              <a:rPr lang="ja-JP" altLang="en-US"/>
               <a:t>第 </a:t>
             </a:r>
             <a:r>
-              <a:rPr kumimoji="1" lang="en-US" altLang="ja-JP"/>
+              <a:rPr lang="en-US" altLang="ja-JP"/>
               <a:t>3 </a:t>
             </a:r>
             <a:r>
-              <a:rPr kumimoji="1" lang="ja-JP" altLang="en-US"/>
+              <a:rPr lang="ja-JP" altLang="en-US"/>
               <a:t>レベル</a:t>
             </a:r>
           </a:p>
           <a:p>
             <a:pPr lvl="3"/>
             <a:r>
-              <a:rPr kumimoji="1" lang="ja-JP" altLang="en-US"/>
+              <a:rPr lang="ja-JP" altLang="en-US"/>
               <a:t>第 </a:t>
             </a:r>
             <a:r>
-              <a:rPr kumimoji="1" lang="en-US" altLang="ja-JP"/>
+              <a:rPr lang="en-US" altLang="ja-JP"/>
               <a:t>4 </a:t>
             </a:r>
             <a:r>
-              <a:rPr kumimoji="1" lang="ja-JP" altLang="en-US"/>
+              <a:rPr lang="ja-JP" altLang="en-US"/>
               <a:t>レベル</a:t>
             </a:r>
           </a:p>
           <a:p>
             <a:pPr lvl="4"/>
             <a:r>
-              <a:rPr kumimoji="1" lang="ja-JP" altLang="en-US"/>
+              <a:rPr lang="ja-JP" altLang="en-US"/>
               <a:t>第 </a:t>
             </a:r>
             <a:r>
-              <a:rPr kumimoji="1" lang="en-US" altLang="ja-JP"/>
+              <a:rPr lang="en-US" altLang="ja-JP"/>
               <a:t>5 </a:t>
             </a:r>
             <a:r>
-              <a:rPr kumimoji="1" lang="ja-JP" altLang="en-US"/>
+              <a:rPr lang="ja-JP" altLang="en-US"/>
               <a:t>レベル</a:t>
             </a:r>
-          </a:p>
-        </p:txBody>
-      </p:sp>
-      <p:sp>
-        <p:nvSpPr>
-          <p:cNvPr id="5" name="日付プレースホルダー 4">
-            <a:extLst>
-              <a:ext uri="{FF2B5EF4-FFF2-40B4-BE49-F238E27FC236}">
-                <a16:creationId xmlns:a16="http://schemas.microsoft.com/office/drawing/2014/main" id="{AA75B29D-DEB7-4AEB-0739-983ECE026BF2}"/>
-              </a:ext>
-            </a:extLst>
-          </p:cNvPr>
+            <a:endParaRPr lang="en-US" dirty="0"/>
+          </a:p>
+        </p:txBody>
+      </p:sp>
+      <p:sp>
+        <p:nvSpPr>
+          <p:cNvPr id="5" name="Date Placeholder 4"/>
           <p:cNvSpPr>
             <a:spLocks noGrp="1"/>
           </p:cNvSpPr>
@@ -1558,7 +1409,7 @@
           <a:p>
             <a:fld id="{DB63C96E-B3B7-45DC-B917-3CA8BDCF5939}" type="datetimeFigureOut">
               <a:rPr kumimoji="1" lang="ja-JP" altLang="en-US" smtClean="0"/>
-              <a:t>2025/2/18</a:t>
+              <a:t>2025/2/24</a:t>
             </a:fld>
             <a:endParaRPr kumimoji="1" lang="ja-JP" altLang="en-US"/>
           </a:p>
@@ -1566,13 +1417,7 @@
       </p:sp>
       <p:sp>
         <p:nvSpPr>
-          <p:cNvPr id="6" name="フッター プレースホルダー 5">
-            <a:extLst>
-              <a:ext uri="{FF2B5EF4-FFF2-40B4-BE49-F238E27FC236}">
-                <a16:creationId xmlns:a16="http://schemas.microsoft.com/office/drawing/2014/main" id="{C6D7A2CF-559E-59B3-8CE6-596430B67A56}"/>
-              </a:ext>
-            </a:extLst>
-          </p:cNvPr>
+          <p:cNvPr id="6" name="Footer Placeholder 5"/>
           <p:cNvSpPr>
             <a:spLocks noGrp="1"/>
           </p:cNvSpPr>
@@ -1591,13 +1436,7 @@
       </p:sp>
       <p:sp>
         <p:nvSpPr>
-          <p:cNvPr id="7" name="スライド番号プレースホルダー 6">
-            <a:extLst>
-              <a:ext uri="{FF2B5EF4-FFF2-40B4-BE49-F238E27FC236}">
-                <a16:creationId xmlns:a16="http://schemas.microsoft.com/office/drawing/2014/main" id="{D82A3DE3-C394-7FCB-A944-D37E6A81F2C7}"/>
-              </a:ext>
-            </a:extLst>
-          </p:cNvPr>
+          <p:cNvPr id="7" name="Slide Number Placeholder 6"/>
           <p:cNvSpPr>
             <a:spLocks noGrp="1"/>
           </p:cNvSpPr>
@@ -1621,7 +1460,7 @@
     </p:spTree>
     <p:extLst>
       <p:ext uri="{BB962C8B-B14F-4D97-AF65-F5344CB8AC3E}">
-        <p14:creationId xmlns:p14="http://schemas.microsoft.com/office/powerpoint/2010/main" val="1741670520"/>
+        <p14:creationId xmlns:p14="http://schemas.microsoft.com/office/powerpoint/2010/main" val="1841879092"/>
       </p:ext>
     </p:extLst>
   </p:cSld>
@@ -1650,13 +1489,7 @@
       </p:grpSpPr>
       <p:sp>
         <p:nvSpPr>
-          <p:cNvPr id="2" name="タイトル 1">
-            <a:extLst>
-              <a:ext uri="{FF2B5EF4-FFF2-40B4-BE49-F238E27FC236}">
-                <a16:creationId xmlns:a16="http://schemas.microsoft.com/office/drawing/2014/main" id="{7AE54090-4BAB-7E02-072D-D076BC12819A}"/>
-              </a:ext>
-            </a:extLst>
-          </p:cNvPr>
+          <p:cNvPr id="2" name="Title 1"/>
           <p:cNvSpPr>
             <a:spLocks noGrp="1"/>
           </p:cNvSpPr>
@@ -1666,8 +1499,8 @@
         </p:nvSpPr>
         <p:spPr>
           <a:xfrm>
-            <a:off x="839788" y="365125"/>
-            <a:ext cx="10515600" cy="1325563"/>
+            <a:off x="682328" y="365127"/>
+            <a:ext cx="8543925" cy="1325563"/>
           </a:xfrm>
         </p:spPr>
         <p:txBody>
@@ -1675,21 +1508,16 @@
           <a:lstStyle/>
           <a:p>
             <a:r>
-              <a:rPr kumimoji="1" lang="ja-JP" altLang="en-US"/>
+              <a:rPr lang="ja-JP" altLang="en-US"/>
               <a:t>マスター タイトルの書式設定</a:t>
             </a:r>
-          </a:p>
-        </p:txBody>
-      </p:sp>
-      <p:sp>
-        <p:nvSpPr>
-          <p:cNvPr id="3" name="テキスト プレースホルダー 2">
-            <a:extLst>
-              <a:ext uri="{FF2B5EF4-FFF2-40B4-BE49-F238E27FC236}">
-                <a16:creationId xmlns:a16="http://schemas.microsoft.com/office/drawing/2014/main" id="{FD511E8C-B23E-177C-E55B-9307ED3D6DCD}"/>
-              </a:ext>
-            </a:extLst>
-          </p:cNvPr>
+            <a:endParaRPr lang="en-US" dirty="0"/>
+          </a:p>
+        </p:txBody>
+      </p:sp>
+      <p:sp>
+        <p:nvSpPr>
+          <p:cNvPr id="3" name="Text Placeholder 2"/>
           <p:cNvSpPr>
             <a:spLocks noGrp="1"/>
           </p:cNvSpPr>
@@ -1699,8 +1527,8 @@
         </p:nvSpPr>
         <p:spPr>
           <a:xfrm>
-            <a:off x="839788" y="1681163"/>
-            <a:ext cx="5157787" cy="823912"/>
+            <a:off x="682329" y="1681163"/>
+            <a:ext cx="4190702" cy="823912"/>
           </a:xfrm>
         </p:spPr>
         <p:txBody>
@@ -1746,7 +1574,7 @@
           <a:p>
             <a:pPr lvl="0"/>
             <a:r>
-              <a:rPr kumimoji="1" lang="ja-JP" altLang="en-US"/>
+              <a:rPr lang="ja-JP" altLang="en-US"/>
               <a:t>マスター テキストの書式設定</a:t>
             </a:r>
           </a:p>
@@ -1754,13 +1582,7 @@
       </p:sp>
       <p:sp>
         <p:nvSpPr>
-          <p:cNvPr id="4" name="コンテンツ プレースホルダー 3">
-            <a:extLst>
-              <a:ext uri="{FF2B5EF4-FFF2-40B4-BE49-F238E27FC236}">
-                <a16:creationId xmlns:a16="http://schemas.microsoft.com/office/drawing/2014/main" id="{D52F2EC1-5B61-2719-6784-F846CC2D3833}"/>
-              </a:ext>
-            </a:extLst>
-          </p:cNvPr>
+          <p:cNvPr id="4" name="Content Placeholder 3"/>
           <p:cNvSpPr>
             <a:spLocks noGrp="1"/>
           </p:cNvSpPr>
@@ -1770,8 +1592,8 @@
         </p:nvSpPr>
         <p:spPr>
           <a:xfrm>
-            <a:off x="839788" y="2505075"/>
-            <a:ext cx="5157787" cy="3684588"/>
+            <a:off x="682329" y="2505075"/>
+            <a:ext cx="4190702" cy="3684588"/>
           </a:xfrm>
         </p:spPr>
         <p:txBody>
@@ -1780,81 +1602,76 @@
           <a:p>
             <a:pPr lvl="0"/>
             <a:r>
-              <a:rPr kumimoji="1" lang="ja-JP" altLang="en-US"/>
+              <a:rPr lang="ja-JP" altLang="en-US"/>
               <a:t>マスター テキストの書式設定</a:t>
             </a:r>
           </a:p>
           <a:p>
             <a:pPr lvl="1"/>
             <a:r>
-              <a:rPr kumimoji="1" lang="ja-JP" altLang="en-US"/>
+              <a:rPr lang="ja-JP" altLang="en-US"/>
               <a:t>第 </a:t>
             </a:r>
             <a:r>
-              <a:rPr kumimoji="1" lang="en-US" altLang="ja-JP"/>
+              <a:rPr lang="en-US" altLang="ja-JP"/>
               <a:t>2 </a:t>
             </a:r>
             <a:r>
-              <a:rPr kumimoji="1" lang="ja-JP" altLang="en-US"/>
+              <a:rPr lang="ja-JP" altLang="en-US"/>
               <a:t>レベル</a:t>
             </a:r>
           </a:p>
           <a:p>
             <a:pPr lvl="2"/>
             <a:r>
-              <a:rPr kumimoji="1" lang="ja-JP" altLang="en-US"/>
+              <a:rPr lang="ja-JP" altLang="en-US"/>
               <a:t>第 </a:t>
             </a:r>
             <a:r>
-              <a:rPr kumimoji="1" lang="en-US" altLang="ja-JP"/>
+              <a:rPr lang="en-US" altLang="ja-JP"/>
               <a:t>3 </a:t>
             </a:r>
             <a:r>
-              <a:rPr kumimoji="1" lang="ja-JP" altLang="en-US"/>
+              <a:rPr lang="ja-JP" altLang="en-US"/>
               <a:t>レベル</a:t>
             </a:r>
           </a:p>
           <a:p>
             <a:pPr lvl="3"/>
             <a:r>
-              <a:rPr kumimoji="1" lang="ja-JP" altLang="en-US"/>
+              <a:rPr lang="ja-JP" altLang="en-US"/>
               <a:t>第 </a:t>
             </a:r>
             <a:r>
-              <a:rPr kumimoji="1" lang="en-US" altLang="ja-JP"/>
+              <a:rPr lang="en-US" altLang="ja-JP"/>
               <a:t>4 </a:t>
             </a:r>
             <a:r>
-              <a:rPr kumimoji="1" lang="ja-JP" altLang="en-US"/>
+              <a:rPr lang="ja-JP" altLang="en-US"/>
               <a:t>レベル</a:t>
             </a:r>
           </a:p>
           <a:p>
             <a:pPr lvl="4"/>
             <a:r>
-              <a:rPr kumimoji="1" lang="ja-JP" altLang="en-US"/>
+              <a:rPr lang="ja-JP" altLang="en-US"/>
               <a:t>第 </a:t>
             </a:r>
             <a:r>
-              <a:rPr kumimoji="1" lang="en-US" altLang="ja-JP"/>
+              <a:rPr lang="en-US" altLang="ja-JP"/>
               <a:t>5 </a:t>
             </a:r>
             <a:r>
-              <a:rPr kumimoji="1" lang="ja-JP" altLang="en-US"/>
+              <a:rPr lang="ja-JP" altLang="en-US"/>
               <a:t>レベル</a:t>
             </a:r>
-          </a:p>
-        </p:txBody>
-      </p:sp>
-      <p:sp>
-        <p:nvSpPr>
-          <p:cNvPr id="5" name="テキスト プレースホルダー 4">
-            <a:extLst>
-              <a:ext uri="{FF2B5EF4-FFF2-40B4-BE49-F238E27FC236}">
-                <a16:creationId xmlns:a16="http://schemas.microsoft.com/office/drawing/2014/main" id="{EF025421-7A9E-6E15-E77F-3D45EA830064}"/>
-              </a:ext>
-            </a:extLst>
-          </p:cNvPr>
+            <a:endParaRPr lang="en-US" dirty="0"/>
+          </a:p>
+        </p:txBody>
+      </p:sp>
+      <p:sp>
+        <p:nvSpPr>
+          <p:cNvPr id="5" name="Text Placeholder 4"/>
           <p:cNvSpPr>
             <a:spLocks noGrp="1"/>
           </p:cNvSpPr>
@@ -1864,8 +1681,8 @@
         </p:nvSpPr>
         <p:spPr>
           <a:xfrm>
-            <a:off x="6172200" y="1681163"/>
-            <a:ext cx="5183188" cy="823912"/>
+            <a:off x="5014913" y="1681163"/>
+            <a:ext cx="4211340" cy="823912"/>
           </a:xfrm>
         </p:spPr>
         <p:txBody>
@@ -1911,7 +1728,7 @@
           <a:p>
             <a:pPr lvl="0"/>
             <a:r>
-              <a:rPr kumimoji="1" lang="ja-JP" altLang="en-US"/>
+              <a:rPr lang="ja-JP" altLang="en-US"/>
               <a:t>マスター テキストの書式設定</a:t>
             </a:r>
           </a:p>
@@ -1919,13 +1736,7 @@
       </p:sp>
       <p:sp>
         <p:nvSpPr>
-          <p:cNvPr id="6" name="コンテンツ プレースホルダー 5">
-            <a:extLst>
-              <a:ext uri="{FF2B5EF4-FFF2-40B4-BE49-F238E27FC236}">
-                <a16:creationId xmlns:a16="http://schemas.microsoft.com/office/drawing/2014/main" id="{6463FE32-D24F-9256-4A39-63D4AB45C9E4}"/>
-              </a:ext>
-            </a:extLst>
-          </p:cNvPr>
+          <p:cNvPr id="6" name="Content Placeholder 5"/>
           <p:cNvSpPr>
             <a:spLocks noGrp="1"/>
           </p:cNvSpPr>
@@ -1935,8 +1746,8 @@
         </p:nvSpPr>
         <p:spPr>
           <a:xfrm>
-            <a:off x="6172200" y="2505075"/>
-            <a:ext cx="5183188" cy="3684588"/>
+            <a:off x="5014913" y="2505075"/>
+            <a:ext cx="4211340" cy="3684588"/>
           </a:xfrm>
         </p:spPr>
         <p:txBody>
@@ -1945,81 +1756,76 @@
           <a:p>
             <a:pPr lvl="0"/>
             <a:r>
-              <a:rPr kumimoji="1" lang="ja-JP" altLang="en-US"/>
+              <a:rPr lang="ja-JP" altLang="en-US"/>
               <a:t>マスター テキストの書式設定</a:t>
             </a:r>
           </a:p>
           <a:p>
             <a:pPr lvl="1"/>
             <a:r>
-              <a:rPr kumimoji="1" lang="ja-JP" altLang="en-US"/>
+              <a:rPr lang="ja-JP" altLang="en-US"/>
               <a:t>第 </a:t>
             </a:r>
             <a:r>
-              <a:rPr kumimoji="1" lang="en-US" altLang="ja-JP"/>
+              <a:rPr lang="en-US" altLang="ja-JP"/>
               <a:t>2 </a:t>
             </a:r>
             <a:r>
-              <a:rPr kumimoji="1" lang="ja-JP" altLang="en-US"/>
+              <a:rPr lang="ja-JP" altLang="en-US"/>
               <a:t>レベル</a:t>
             </a:r>
           </a:p>
           <a:p>
             <a:pPr lvl="2"/>
             <a:r>
-              <a:rPr kumimoji="1" lang="ja-JP" altLang="en-US"/>
+              <a:rPr lang="ja-JP" altLang="en-US"/>
               <a:t>第 </a:t>
             </a:r>
             <a:r>
-              <a:rPr kumimoji="1" lang="en-US" altLang="ja-JP"/>
+              <a:rPr lang="en-US" altLang="ja-JP"/>
               <a:t>3 </a:t>
             </a:r>
             <a:r>
-              <a:rPr kumimoji="1" lang="ja-JP" altLang="en-US"/>
+              <a:rPr lang="ja-JP" altLang="en-US"/>
               <a:t>レベル</a:t>
             </a:r>
           </a:p>
           <a:p>
             <a:pPr lvl="3"/>
             <a:r>
-              <a:rPr kumimoji="1" lang="ja-JP" altLang="en-US"/>
+              <a:rPr lang="ja-JP" altLang="en-US"/>
               <a:t>第 </a:t>
             </a:r>
             <a:r>
-              <a:rPr kumimoji="1" lang="en-US" altLang="ja-JP"/>
+              <a:rPr lang="en-US" altLang="ja-JP"/>
               <a:t>4 </a:t>
             </a:r>
             <a:r>
-              <a:rPr kumimoji="1" lang="ja-JP" altLang="en-US"/>
+              <a:rPr lang="ja-JP" altLang="en-US"/>
               <a:t>レベル</a:t>
             </a:r>
           </a:p>
           <a:p>
             <a:pPr lvl="4"/>
             <a:r>
-              <a:rPr kumimoji="1" lang="ja-JP" altLang="en-US"/>
+              <a:rPr lang="ja-JP" altLang="en-US"/>
               <a:t>第 </a:t>
             </a:r>
             <a:r>
-              <a:rPr kumimoji="1" lang="en-US" altLang="ja-JP"/>
+              <a:rPr lang="en-US" altLang="ja-JP"/>
               <a:t>5 </a:t>
             </a:r>
             <a:r>
-              <a:rPr kumimoji="1" lang="ja-JP" altLang="en-US"/>
+              <a:rPr lang="ja-JP" altLang="en-US"/>
               <a:t>レベル</a:t>
             </a:r>
-          </a:p>
-        </p:txBody>
-      </p:sp>
-      <p:sp>
-        <p:nvSpPr>
-          <p:cNvPr id="7" name="日付プレースホルダー 6">
-            <a:extLst>
-              <a:ext uri="{FF2B5EF4-FFF2-40B4-BE49-F238E27FC236}">
-                <a16:creationId xmlns:a16="http://schemas.microsoft.com/office/drawing/2014/main" id="{AB714E10-C1A9-F343-B0E0-614B0917138D}"/>
-              </a:ext>
-            </a:extLst>
-          </p:cNvPr>
+            <a:endParaRPr lang="en-US" dirty="0"/>
+          </a:p>
+        </p:txBody>
+      </p:sp>
+      <p:sp>
+        <p:nvSpPr>
+          <p:cNvPr id="7" name="Date Placeholder 6"/>
           <p:cNvSpPr>
             <a:spLocks noGrp="1"/>
           </p:cNvSpPr>
@@ -2034,7 +1840,7 @@
           <a:p>
             <a:fld id="{DB63C96E-B3B7-45DC-B917-3CA8BDCF5939}" type="datetimeFigureOut">
               <a:rPr kumimoji="1" lang="ja-JP" altLang="en-US" smtClean="0"/>
-              <a:t>2025/2/18</a:t>
+              <a:t>2025/2/24</a:t>
             </a:fld>
             <a:endParaRPr kumimoji="1" lang="ja-JP" altLang="en-US"/>
           </a:p>
@@ -2042,13 +1848,7 @@
       </p:sp>
       <p:sp>
         <p:nvSpPr>
-          <p:cNvPr id="8" name="フッター プレースホルダー 7">
-            <a:extLst>
-              <a:ext uri="{FF2B5EF4-FFF2-40B4-BE49-F238E27FC236}">
-                <a16:creationId xmlns:a16="http://schemas.microsoft.com/office/drawing/2014/main" id="{8D0424DB-CE2D-D973-8B09-4798DAA72BF7}"/>
-              </a:ext>
-            </a:extLst>
-          </p:cNvPr>
+          <p:cNvPr id="8" name="Footer Placeholder 7"/>
           <p:cNvSpPr>
             <a:spLocks noGrp="1"/>
           </p:cNvSpPr>
@@ -2067,13 +1867,7 @@
       </p:sp>
       <p:sp>
         <p:nvSpPr>
-          <p:cNvPr id="9" name="スライド番号プレースホルダー 8">
-            <a:extLst>
-              <a:ext uri="{FF2B5EF4-FFF2-40B4-BE49-F238E27FC236}">
-                <a16:creationId xmlns:a16="http://schemas.microsoft.com/office/drawing/2014/main" id="{40798A08-195D-FE49-056E-4861E1FAC422}"/>
-              </a:ext>
-            </a:extLst>
-          </p:cNvPr>
+          <p:cNvPr id="9" name="Slide Number Placeholder 8"/>
           <p:cNvSpPr>
             <a:spLocks noGrp="1"/>
           </p:cNvSpPr>
@@ -2097,7 +1891,7 @@
     </p:spTree>
     <p:extLst>
       <p:ext uri="{BB962C8B-B14F-4D97-AF65-F5344CB8AC3E}">
-        <p14:creationId xmlns:p14="http://schemas.microsoft.com/office/powerpoint/2010/main" val="2286878285"/>
+        <p14:creationId xmlns:p14="http://schemas.microsoft.com/office/powerpoint/2010/main" val="2151565032"/>
       </p:ext>
     </p:extLst>
   </p:cSld>
@@ -2126,13 +1920,7 @@
       </p:grpSpPr>
       <p:sp>
         <p:nvSpPr>
-          <p:cNvPr id="2" name="タイトル 1">
-            <a:extLst>
-              <a:ext uri="{FF2B5EF4-FFF2-40B4-BE49-F238E27FC236}">
-                <a16:creationId xmlns:a16="http://schemas.microsoft.com/office/drawing/2014/main" id="{C4CDF674-19CA-A34B-A52C-B889B16041BA}"/>
-              </a:ext>
-            </a:extLst>
-          </p:cNvPr>
+          <p:cNvPr id="2" name="Title 1"/>
           <p:cNvSpPr>
             <a:spLocks noGrp="1"/>
           </p:cNvSpPr>
@@ -2146,21 +1934,16 @@
           <a:lstStyle/>
           <a:p>
             <a:r>
-              <a:rPr kumimoji="1" lang="ja-JP" altLang="en-US"/>
+              <a:rPr lang="ja-JP" altLang="en-US"/>
               <a:t>マスター タイトルの書式設定</a:t>
             </a:r>
-          </a:p>
-        </p:txBody>
-      </p:sp>
-      <p:sp>
-        <p:nvSpPr>
-          <p:cNvPr id="3" name="日付プレースホルダー 2">
-            <a:extLst>
-              <a:ext uri="{FF2B5EF4-FFF2-40B4-BE49-F238E27FC236}">
-                <a16:creationId xmlns:a16="http://schemas.microsoft.com/office/drawing/2014/main" id="{A15210A5-2362-E422-21BA-58F8360992BD}"/>
-              </a:ext>
-            </a:extLst>
-          </p:cNvPr>
+            <a:endParaRPr lang="en-US" dirty="0"/>
+          </a:p>
+        </p:txBody>
+      </p:sp>
+      <p:sp>
+        <p:nvSpPr>
+          <p:cNvPr id="3" name="Date Placeholder 2"/>
           <p:cNvSpPr>
             <a:spLocks noGrp="1"/>
           </p:cNvSpPr>
@@ -2175,7 +1958,7 @@
           <a:p>
             <a:fld id="{DB63C96E-B3B7-45DC-B917-3CA8BDCF5939}" type="datetimeFigureOut">
               <a:rPr kumimoji="1" lang="ja-JP" altLang="en-US" smtClean="0"/>
-              <a:t>2025/2/18</a:t>
+              <a:t>2025/2/24</a:t>
             </a:fld>
             <a:endParaRPr kumimoji="1" lang="ja-JP" altLang="en-US"/>
           </a:p>
@@ -2183,13 +1966,7 @@
       </p:sp>
       <p:sp>
         <p:nvSpPr>
-          <p:cNvPr id="4" name="フッター プレースホルダー 3">
-            <a:extLst>
-              <a:ext uri="{FF2B5EF4-FFF2-40B4-BE49-F238E27FC236}">
-                <a16:creationId xmlns:a16="http://schemas.microsoft.com/office/drawing/2014/main" id="{F6BDB057-BCFA-C260-CC51-E653CF737462}"/>
-              </a:ext>
-            </a:extLst>
-          </p:cNvPr>
+          <p:cNvPr id="4" name="Footer Placeholder 3"/>
           <p:cNvSpPr>
             <a:spLocks noGrp="1"/>
           </p:cNvSpPr>
@@ -2208,13 +1985,7 @@
       </p:sp>
       <p:sp>
         <p:nvSpPr>
-          <p:cNvPr id="5" name="スライド番号プレースホルダー 4">
-            <a:extLst>
-              <a:ext uri="{FF2B5EF4-FFF2-40B4-BE49-F238E27FC236}">
-                <a16:creationId xmlns:a16="http://schemas.microsoft.com/office/drawing/2014/main" id="{CD3B89E8-5DE5-0524-DF82-FDFCA073E3DB}"/>
-              </a:ext>
-            </a:extLst>
-          </p:cNvPr>
+          <p:cNvPr id="5" name="Slide Number Placeholder 4"/>
           <p:cNvSpPr>
             <a:spLocks noGrp="1"/>
           </p:cNvSpPr>
@@ -2238,7 +2009,7 @@
     </p:spTree>
     <p:extLst>
       <p:ext uri="{BB962C8B-B14F-4D97-AF65-F5344CB8AC3E}">
-        <p14:creationId xmlns:p14="http://schemas.microsoft.com/office/powerpoint/2010/main" val="3344915393"/>
+        <p14:creationId xmlns:p14="http://schemas.microsoft.com/office/powerpoint/2010/main" val="4211551815"/>
       </p:ext>
     </p:extLst>
   </p:cSld>
@@ -2267,13 +2038,7 @@
       </p:grpSpPr>
       <p:sp>
         <p:nvSpPr>
-          <p:cNvPr id="2" name="日付プレースホルダー 1">
-            <a:extLst>
-              <a:ext uri="{FF2B5EF4-FFF2-40B4-BE49-F238E27FC236}">
-                <a16:creationId xmlns:a16="http://schemas.microsoft.com/office/drawing/2014/main" id="{6AE25C2F-B917-0104-5BE8-7B1387E02C8E}"/>
-              </a:ext>
-            </a:extLst>
-          </p:cNvPr>
+          <p:cNvPr id="2" name="Date Placeholder 1"/>
           <p:cNvSpPr>
             <a:spLocks noGrp="1"/>
           </p:cNvSpPr>
@@ -2288,7 +2053,7 @@
           <a:p>
             <a:fld id="{DB63C96E-B3B7-45DC-B917-3CA8BDCF5939}" type="datetimeFigureOut">
               <a:rPr kumimoji="1" lang="ja-JP" altLang="en-US" smtClean="0"/>
-              <a:t>2025/2/18</a:t>
+              <a:t>2025/2/24</a:t>
             </a:fld>
             <a:endParaRPr kumimoji="1" lang="ja-JP" altLang="en-US"/>
           </a:p>
@@ -2296,13 +2061,7 @@
       </p:sp>
       <p:sp>
         <p:nvSpPr>
-          <p:cNvPr id="3" name="フッター プレースホルダー 2">
-            <a:extLst>
-              <a:ext uri="{FF2B5EF4-FFF2-40B4-BE49-F238E27FC236}">
-                <a16:creationId xmlns:a16="http://schemas.microsoft.com/office/drawing/2014/main" id="{3C4DDBE4-B3AC-D88D-D411-FFBE4C3B5F7E}"/>
-              </a:ext>
-            </a:extLst>
-          </p:cNvPr>
+          <p:cNvPr id="3" name="Footer Placeholder 2"/>
           <p:cNvSpPr>
             <a:spLocks noGrp="1"/>
           </p:cNvSpPr>
@@ -2321,13 +2080,7 @@
       </p:sp>
       <p:sp>
         <p:nvSpPr>
-          <p:cNvPr id="4" name="スライド番号プレースホルダー 3">
-            <a:extLst>
-              <a:ext uri="{FF2B5EF4-FFF2-40B4-BE49-F238E27FC236}">
-                <a16:creationId xmlns:a16="http://schemas.microsoft.com/office/drawing/2014/main" id="{94F0843F-E4B6-7955-B357-437158834ADD}"/>
-              </a:ext>
-            </a:extLst>
-          </p:cNvPr>
+          <p:cNvPr id="4" name="Slide Number Placeholder 3"/>
           <p:cNvSpPr>
             <a:spLocks noGrp="1"/>
           </p:cNvSpPr>
@@ -2351,7 +2104,7 @@
     </p:spTree>
     <p:extLst>
       <p:ext uri="{BB962C8B-B14F-4D97-AF65-F5344CB8AC3E}">
-        <p14:creationId xmlns:p14="http://schemas.microsoft.com/office/powerpoint/2010/main" val="1553039724"/>
+        <p14:creationId xmlns:p14="http://schemas.microsoft.com/office/powerpoint/2010/main" val="2640269741"/>
       </p:ext>
     </p:extLst>
   </p:cSld>
@@ -2380,13 +2133,7 @@
       </p:grpSpPr>
       <p:sp>
         <p:nvSpPr>
-          <p:cNvPr id="2" name="タイトル 1">
-            <a:extLst>
-              <a:ext uri="{FF2B5EF4-FFF2-40B4-BE49-F238E27FC236}">
-                <a16:creationId xmlns:a16="http://schemas.microsoft.com/office/drawing/2014/main" id="{144218EA-681E-CC92-0EB8-21636586BDA2}"/>
-              </a:ext>
-            </a:extLst>
-          </p:cNvPr>
+          <p:cNvPr id="2" name="Title 1"/>
           <p:cNvSpPr>
             <a:spLocks noGrp="1"/>
           </p:cNvSpPr>
@@ -2396,8 +2143,8 @@
         </p:nvSpPr>
         <p:spPr>
           <a:xfrm>
-            <a:off x="839788" y="457200"/>
-            <a:ext cx="3932237" cy="1600200"/>
+            <a:off x="682328" y="457200"/>
+            <a:ext cx="3194943" cy="1600200"/>
           </a:xfrm>
         </p:spPr>
         <p:txBody>
@@ -2409,21 +2156,16 @@
           </a:lstStyle>
           <a:p>
             <a:r>
-              <a:rPr kumimoji="1" lang="ja-JP" altLang="en-US"/>
+              <a:rPr lang="ja-JP" altLang="en-US"/>
               <a:t>マスター タイトルの書式設定</a:t>
             </a:r>
-          </a:p>
-        </p:txBody>
-      </p:sp>
-      <p:sp>
-        <p:nvSpPr>
-          <p:cNvPr id="3" name="コンテンツ プレースホルダー 2">
-            <a:extLst>
-              <a:ext uri="{FF2B5EF4-FFF2-40B4-BE49-F238E27FC236}">
-                <a16:creationId xmlns:a16="http://schemas.microsoft.com/office/drawing/2014/main" id="{13F6058A-75B2-BC72-7C56-6FAB2A98030F}"/>
-              </a:ext>
-            </a:extLst>
-          </p:cNvPr>
+            <a:endParaRPr lang="en-US" dirty="0"/>
+          </a:p>
+        </p:txBody>
+      </p:sp>
+      <p:sp>
+        <p:nvSpPr>
+          <p:cNvPr id="3" name="Content Placeholder 2"/>
           <p:cNvSpPr>
             <a:spLocks noGrp="1"/>
           </p:cNvSpPr>
@@ -2433,8 +2175,8 @@
         </p:nvSpPr>
         <p:spPr>
           <a:xfrm>
-            <a:off x="5183188" y="987425"/>
-            <a:ext cx="6172200" cy="4873625"/>
+            <a:off x="4211340" y="987427"/>
+            <a:ext cx="5014913" cy="4873625"/>
           </a:xfrm>
         </p:spPr>
         <p:txBody>
@@ -2471,81 +2213,76 @@
           <a:p>
             <a:pPr lvl="0"/>
             <a:r>
-              <a:rPr kumimoji="1" lang="ja-JP" altLang="en-US"/>
+              <a:rPr lang="ja-JP" altLang="en-US"/>
               <a:t>マスター テキストの書式設定</a:t>
             </a:r>
           </a:p>
           <a:p>
             <a:pPr lvl="1"/>
             <a:r>
-              <a:rPr kumimoji="1" lang="ja-JP" altLang="en-US"/>
+              <a:rPr lang="ja-JP" altLang="en-US"/>
               <a:t>第 </a:t>
             </a:r>
             <a:r>
-              <a:rPr kumimoji="1" lang="en-US" altLang="ja-JP"/>
+              <a:rPr lang="en-US" altLang="ja-JP"/>
               <a:t>2 </a:t>
             </a:r>
             <a:r>
-              <a:rPr kumimoji="1" lang="ja-JP" altLang="en-US"/>
+              <a:rPr lang="ja-JP" altLang="en-US"/>
               <a:t>レベル</a:t>
             </a:r>
           </a:p>
           <a:p>
             <a:pPr lvl="2"/>
             <a:r>
-              <a:rPr kumimoji="1" lang="ja-JP" altLang="en-US"/>
+              <a:rPr lang="ja-JP" altLang="en-US"/>
               <a:t>第 </a:t>
             </a:r>
             <a:r>
-              <a:rPr kumimoji="1" lang="en-US" altLang="ja-JP"/>
+              <a:rPr lang="en-US" altLang="ja-JP"/>
               <a:t>3 </a:t>
             </a:r>
             <a:r>
-              <a:rPr kumimoji="1" lang="ja-JP" altLang="en-US"/>
+              <a:rPr lang="ja-JP" altLang="en-US"/>
               <a:t>レベル</a:t>
             </a:r>
           </a:p>
           <a:p>
             <a:pPr lvl="3"/>
             <a:r>
-              <a:rPr kumimoji="1" lang="ja-JP" altLang="en-US"/>
+              <a:rPr lang="ja-JP" altLang="en-US"/>
               <a:t>第 </a:t>
             </a:r>
             <a:r>
-              <a:rPr kumimoji="1" lang="en-US" altLang="ja-JP"/>
+              <a:rPr lang="en-US" altLang="ja-JP"/>
               <a:t>4 </a:t>
             </a:r>
             <a:r>
-              <a:rPr kumimoji="1" lang="ja-JP" altLang="en-US"/>
+              <a:rPr lang="ja-JP" altLang="en-US"/>
               <a:t>レベル</a:t>
             </a:r>
           </a:p>
           <a:p>
             <a:pPr lvl="4"/>
             <a:r>
-              <a:rPr kumimoji="1" lang="ja-JP" altLang="en-US"/>
+              <a:rPr lang="ja-JP" altLang="en-US"/>
               <a:t>第 </a:t>
             </a:r>
             <a:r>
-              <a:rPr kumimoji="1" lang="en-US" altLang="ja-JP"/>
+              <a:rPr lang="en-US" altLang="ja-JP"/>
               <a:t>5 </a:t>
             </a:r>
             <a:r>
-              <a:rPr kumimoji="1" lang="ja-JP" altLang="en-US"/>
+              <a:rPr lang="ja-JP" altLang="en-US"/>
               <a:t>レベル</a:t>
             </a:r>
-          </a:p>
-        </p:txBody>
-      </p:sp>
-      <p:sp>
-        <p:nvSpPr>
-          <p:cNvPr id="4" name="テキスト プレースホルダー 3">
-            <a:extLst>
-              <a:ext uri="{FF2B5EF4-FFF2-40B4-BE49-F238E27FC236}">
-                <a16:creationId xmlns:a16="http://schemas.microsoft.com/office/drawing/2014/main" id="{DEB15713-CC7A-564A-F3A4-1D56B0213BA6}"/>
-              </a:ext>
-            </a:extLst>
-          </p:cNvPr>
+            <a:endParaRPr lang="en-US" dirty="0"/>
+          </a:p>
+        </p:txBody>
+      </p:sp>
+      <p:sp>
+        <p:nvSpPr>
+          <p:cNvPr id="4" name="Text Placeholder 3"/>
           <p:cNvSpPr>
             <a:spLocks noGrp="1"/>
           </p:cNvSpPr>
@@ -2555,8 +2292,8 @@
         </p:nvSpPr>
         <p:spPr>
           <a:xfrm>
-            <a:off x="839788" y="2057400"/>
-            <a:ext cx="3932237" cy="3811588"/>
+            <a:off x="682328" y="2057400"/>
+            <a:ext cx="3194943" cy="3811588"/>
           </a:xfrm>
         </p:spPr>
         <p:txBody>
@@ -2602,7 +2339,7 @@
           <a:p>
             <a:pPr lvl="0"/>
             <a:r>
-              <a:rPr kumimoji="1" lang="ja-JP" altLang="en-US"/>
+              <a:rPr lang="ja-JP" altLang="en-US"/>
               <a:t>マスター テキストの書式設定</a:t>
             </a:r>
           </a:p>
@@ -2610,13 +2347,7 @@
       </p:sp>
       <p:sp>
         <p:nvSpPr>
-          <p:cNvPr id="5" name="日付プレースホルダー 4">
-            <a:extLst>
-              <a:ext uri="{FF2B5EF4-FFF2-40B4-BE49-F238E27FC236}">
-                <a16:creationId xmlns:a16="http://schemas.microsoft.com/office/drawing/2014/main" id="{1374449E-A433-62CD-3B10-C3545E6E046E}"/>
-              </a:ext>
-            </a:extLst>
-          </p:cNvPr>
+          <p:cNvPr id="5" name="Date Placeholder 4"/>
           <p:cNvSpPr>
             <a:spLocks noGrp="1"/>
           </p:cNvSpPr>
@@ -2631,7 +2362,7 @@
           <a:p>
             <a:fld id="{DB63C96E-B3B7-45DC-B917-3CA8BDCF5939}" type="datetimeFigureOut">
               <a:rPr kumimoji="1" lang="ja-JP" altLang="en-US" smtClean="0"/>
-              <a:t>2025/2/18</a:t>
+              <a:t>2025/2/24</a:t>
             </a:fld>
             <a:endParaRPr kumimoji="1" lang="ja-JP" altLang="en-US"/>
           </a:p>
@@ -2639,13 +2370,7 @@
       </p:sp>
       <p:sp>
         <p:nvSpPr>
-          <p:cNvPr id="6" name="フッター プレースホルダー 5">
-            <a:extLst>
-              <a:ext uri="{FF2B5EF4-FFF2-40B4-BE49-F238E27FC236}">
-                <a16:creationId xmlns:a16="http://schemas.microsoft.com/office/drawing/2014/main" id="{6BF4FEE2-E7A3-E288-44B7-61892B0F2C04}"/>
-              </a:ext>
-            </a:extLst>
-          </p:cNvPr>
+          <p:cNvPr id="6" name="Footer Placeholder 5"/>
           <p:cNvSpPr>
             <a:spLocks noGrp="1"/>
           </p:cNvSpPr>
@@ -2664,13 +2389,7 @@
       </p:sp>
       <p:sp>
         <p:nvSpPr>
-          <p:cNvPr id="7" name="スライド番号プレースホルダー 6">
-            <a:extLst>
-              <a:ext uri="{FF2B5EF4-FFF2-40B4-BE49-F238E27FC236}">
-                <a16:creationId xmlns:a16="http://schemas.microsoft.com/office/drawing/2014/main" id="{6D0BB5B8-8C33-6B65-6464-3D5155B5674F}"/>
-              </a:ext>
-            </a:extLst>
-          </p:cNvPr>
+          <p:cNvPr id="7" name="Slide Number Placeholder 6"/>
           <p:cNvSpPr>
             <a:spLocks noGrp="1"/>
           </p:cNvSpPr>
@@ -2694,7 +2413,7 @@
     </p:spTree>
     <p:extLst>
       <p:ext uri="{BB962C8B-B14F-4D97-AF65-F5344CB8AC3E}">
-        <p14:creationId xmlns:p14="http://schemas.microsoft.com/office/powerpoint/2010/main" val="2775200371"/>
+        <p14:creationId xmlns:p14="http://schemas.microsoft.com/office/powerpoint/2010/main" val="1858820958"/>
       </p:ext>
     </p:extLst>
   </p:cSld>
@@ -2723,13 +2442,7 @@
       </p:grpSpPr>
       <p:sp>
         <p:nvSpPr>
-          <p:cNvPr id="2" name="タイトル 1">
-            <a:extLst>
-              <a:ext uri="{FF2B5EF4-FFF2-40B4-BE49-F238E27FC236}">
-                <a16:creationId xmlns:a16="http://schemas.microsoft.com/office/drawing/2014/main" id="{545F7B98-874A-68C2-A887-5EA82A010B6C}"/>
-              </a:ext>
-            </a:extLst>
-          </p:cNvPr>
+          <p:cNvPr id="2" name="Title 1"/>
           <p:cNvSpPr>
             <a:spLocks noGrp="1"/>
           </p:cNvSpPr>
@@ -2739,8 +2452,8 @@
         </p:nvSpPr>
         <p:spPr>
           <a:xfrm>
-            <a:off x="839788" y="457200"/>
-            <a:ext cx="3932237" cy="1600200"/>
+            <a:off x="682328" y="457200"/>
+            <a:ext cx="3194943" cy="1600200"/>
           </a:xfrm>
         </p:spPr>
         <p:txBody>
@@ -2752,23 +2465,18 @@
           </a:lstStyle>
           <a:p>
             <a:r>
-              <a:rPr kumimoji="1" lang="ja-JP" altLang="en-US"/>
+              <a:rPr lang="ja-JP" altLang="en-US"/>
               <a:t>マスター タイトルの書式設定</a:t>
             </a:r>
-          </a:p>
-        </p:txBody>
-      </p:sp>
-      <p:sp>
-        <p:nvSpPr>
-          <p:cNvPr id="3" name="図プレースホルダー 2">
-            <a:extLst>
-              <a:ext uri="{FF2B5EF4-FFF2-40B4-BE49-F238E27FC236}">
-                <a16:creationId xmlns:a16="http://schemas.microsoft.com/office/drawing/2014/main" id="{77DCA966-94B5-DFE0-7928-0FBB1319E6CB}"/>
-              </a:ext>
-            </a:extLst>
-          </p:cNvPr>
-          <p:cNvSpPr>
-            <a:spLocks noGrp="1"/>
+            <a:endParaRPr lang="en-US" dirty="0"/>
+          </a:p>
+        </p:txBody>
+      </p:sp>
+      <p:sp>
+        <p:nvSpPr>
+          <p:cNvPr id="3" name="Picture Placeholder 2"/>
+          <p:cNvSpPr>
+            <a:spLocks noGrp="1" noChangeAspect="1"/>
           </p:cNvSpPr>
           <p:nvPr>
             <p:ph type="pic" idx="1"/>
@@ -2776,12 +2484,12 @@
         </p:nvSpPr>
         <p:spPr>
           <a:xfrm>
-            <a:off x="5183188" y="987425"/>
-            <a:ext cx="6172200" cy="4873625"/>
+            <a:off x="4211340" y="987427"/>
+            <a:ext cx="5014913" cy="4873625"/>
           </a:xfrm>
         </p:spPr>
         <p:txBody>
-          <a:bodyPr/>
+          <a:bodyPr anchor="t"/>
           <a:lstStyle>
             <a:lvl1pPr marL="0" indent="0">
               <a:buNone/>
@@ -2821,19 +2529,17 @@
             </a:lvl9pPr>
           </a:lstStyle>
           <a:p>
-            <a:endParaRPr kumimoji="1" lang="ja-JP" altLang="en-US"/>
-          </a:p>
-        </p:txBody>
-      </p:sp>
-      <p:sp>
-        <p:nvSpPr>
-          <p:cNvPr id="4" name="テキスト プレースホルダー 3">
-            <a:extLst>
-              <a:ext uri="{FF2B5EF4-FFF2-40B4-BE49-F238E27FC236}">
-                <a16:creationId xmlns:a16="http://schemas.microsoft.com/office/drawing/2014/main" id="{7ED18E42-0DC9-F3B0-BC81-A29780F6DCAC}"/>
-              </a:ext>
-            </a:extLst>
-          </p:cNvPr>
+            <a:r>
+              <a:rPr lang="ja-JP" altLang="en-US"/>
+              <a:t>アイコンをクリックして図を追加</a:t>
+            </a:r>
+            <a:endParaRPr lang="en-US" dirty="0"/>
+          </a:p>
+        </p:txBody>
+      </p:sp>
+      <p:sp>
+        <p:nvSpPr>
+          <p:cNvPr id="4" name="Text Placeholder 3"/>
           <p:cNvSpPr>
             <a:spLocks noGrp="1"/>
           </p:cNvSpPr>
@@ -2843,8 +2549,8 @@
         </p:nvSpPr>
         <p:spPr>
           <a:xfrm>
-            <a:off x="839788" y="2057400"/>
-            <a:ext cx="3932237" cy="3811588"/>
+            <a:off x="682328" y="2057400"/>
+            <a:ext cx="3194943" cy="3811588"/>
           </a:xfrm>
         </p:spPr>
         <p:txBody>
@@ -2890,7 +2596,7 @@
           <a:p>
             <a:pPr lvl="0"/>
             <a:r>
-              <a:rPr kumimoji="1" lang="ja-JP" altLang="en-US"/>
+              <a:rPr lang="ja-JP" altLang="en-US"/>
               <a:t>マスター テキストの書式設定</a:t>
             </a:r>
           </a:p>
@@ -2898,13 +2604,7 @@
       </p:sp>
       <p:sp>
         <p:nvSpPr>
-          <p:cNvPr id="5" name="日付プレースホルダー 4">
-            <a:extLst>
-              <a:ext uri="{FF2B5EF4-FFF2-40B4-BE49-F238E27FC236}">
-                <a16:creationId xmlns:a16="http://schemas.microsoft.com/office/drawing/2014/main" id="{5EF7641D-61B9-489B-1D18-109F76021E26}"/>
-              </a:ext>
-            </a:extLst>
-          </p:cNvPr>
+          <p:cNvPr id="5" name="Date Placeholder 4"/>
           <p:cNvSpPr>
             <a:spLocks noGrp="1"/>
           </p:cNvSpPr>
@@ -2919,7 +2619,7 @@
           <a:p>
             <a:fld id="{DB63C96E-B3B7-45DC-B917-3CA8BDCF5939}" type="datetimeFigureOut">
               <a:rPr kumimoji="1" lang="ja-JP" altLang="en-US" smtClean="0"/>
-              <a:t>2025/2/18</a:t>
+              <a:t>2025/2/24</a:t>
             </a:fld>
             <a:endParaRPr kumimoji="1" lang="ja-JP" altLang="en-US"/>
           </a:p>
@@ -2927,13 +2627,7 @@
       </p:sp>
       <p:sp>
         <p:nvSpPr>
-          <p:cNvPr id="6" name="フッター プレースホルダー 5">
-            <a:extLst>
-              <a:ext uri="{FF2B5EF4-FFF2-40B4-BE49-F238E27FC236}">
-                <a16:creationId xmlns:a16="http://schemas.microsoft.com/office/drawing/2014/main" id="{4F58B412-14E7-1379-4349-D4FF30172A56}"/>
-              </a:ext>
-            </a:extLst>
-          </p:cNvPr>
+          <p:cNvPr id="6" name="Footer Placeholder 5"/>
           <p:cNvSpPr>
             <a:spLocks noGrp="1"/>
           </p:cNvSpPr>
@@ -2952,13 +2646,7 @@
       </p:sp>
       <p:sp>
         <p:nvSpPr>
-          <p:cNvPr id="7" name="スライド番号プレースホルダー 6">
-            <a:extLst>
-              <a:ext uri="{FF2B5EF4-FFF2-40B4-BE49-F238E27FC236}">
-                <a16:creationId xmlns:a16="http://schemas.microsoft.com/office/drawing/2014/main" id="{AE8698B4-71D5-AD3E-088C-A983D15070C8}"/>
-              </a:ext>
-            </a:extLst>
-          </p:cNvPr>
+          <p:cNvPr id="7" name="Slide Number Placeholder 6"/>
           <p:cNvSpPr>
             <a:spLocks noGrp="1"/>
           </p:cNvSpPr>
@@ -2982,7 +2670,7 @@
     </p:spTree>
     <p:extLst>
       <p:ext uri="{BB962C8B-B14F-4D97-AF65-F5344CB8AC3E}">
-        <p14:creationId xmlns:p14="http://schemas.microsoft.com/office/powerpoint/2010/main" val="3529932997"/>
+        <p14:creationId xmlns:p14="http://schemas.microsoft.com/office/powerpoint/2010/main" val="1201457676"/>
       </p:ext>
     </p:extLst>
   </p:cSld>
@@ -2996,12 +2684,9 @@
 <p:sldMaster xmlns:a="http://schemas.openxmlformats.org/drawingml/2006/main" xmlns:r="http://schemas.openxmlformats.org/officeDocument/2006/relationships" xmlns:p="http://schemas.openxmlformats.org/presentationml/2006/main">
   <p:cSld>
     <p:bg>
-      <p:bgPr>
-        <a:solidFill>
-          <a:srgbClr val="00FF00"/>
-        </a:solidFill>
-        <a:effectLst/>
-      </p:bgPr>
+      <p:bgRef idx="1001">
+        <a:schemeClr val="bg1"/>
+      </p:bgRef>
     </p:bg>
     <p:spTree>
       <p:nvGrpSpPr>
@@ -3019,13 +2704,7 @@
       </p:grpSpPr>
       <p:sp>
         <p:nvSpPr>
-          <p:cNvPr id="2" name="タイトル プレースホルダー 1">
-            <a:extLst>
-              <a:ext uri="{FF2B5EF4-FFF2-40B4-BE49-F238E27FC236}">
-                <a16:creationId xmlns:a16="http://schemas.microsoft.com/office/drawing/2014/main" id="{0F9DD067-FE81-ED43-DFC4-392D7B7BFF72}"/>
-              </a:ext>
-            </a:extLst>
-          </p:cNvPr>
+          <p:cNvPr id="2" name="Title Placeholder 1"/>
           <p:cNvSpPr>
             <a:spLocks noGrp="1"/>
           </p:cNvSpPr>
@@ -3035,8 +2714,8 @@
         </p:nvSpPr>
         <p:spPr>
           <a:xfrm>
-            <a:off x="838200" y="365125"/>
-            <a:ext cx="10515600" cy="1325563"/>
+            <a:off x="681038" y="365127"/>
+            <a:ext cx="8543925" cy="1325563"/>
           </a:xfrm>
           <a:prstGeom prst="rect">
             <a:avLst/>
@@ -3049,21 +2728,16 @@
           <a:lstStyle/>
           <a:p>
             <a:r>
-              <a:rPr kumimoji="1" lang="ja-JP" altLang="en-US"/>
+              <a:rPr lang="ja-JP" altLang="en-US"/>
               <a:t>マスター タイトルの書式設定</a:t>
             </a:r>
-          </a:p>
-        </p:txBody>
-      </p:sp>
-      <p:sp>
-        <p:nvSpPr>
-          <p:cNvPr id="3" name="テキスト プレースホルダー 2">
-            <a:extLst>
-              <a:ext uri="{FF2B5EF4-FFF2-40B4-BE49-F238E27FC236}">
-                <a16:creationId xmlns:a16="http://schemas.microsoft.com/office/drawing/2014/main" id="{BA3278AC-6D67-5A87-35C6-D68FD604ED3C}"/>
-              </a:ext>
-            </a:extLst>
-          </p:cNvPr>
+            <a:endParaRPr lang="en-US" dirty="0"/>
+          </a:p>
+        </p:txBody>
+      </p:sp>
+      <p:sp>
+        <p:nvSpPr>
+          <p:cNvPr id="3" name="Text Placeholder 2"/>
           <p:cNvSpPr>
             <a:spLocks noGrp="1"/>
           </p:cNvSpPr>
@@ -3073,8 +2747,8 @@
         </p:nvSpPr>
         <p:spPr>
           <a:xfrm>
-            <a:off x="838200" y="1825625"/>
-            <a:ext cx="10515600" cy="4351338"/>
+            <a:off x="681038" y="1825625"/>
+            <a:ext cx="8543925" cy="4351338"/>
           </a:xfrm>
           <a:prstGeom prst="rect">
             <a:avLst/>
@@ -3088,81 +2762,76 @@
           <a:p>
             <a:pPr lvl="0"/>
             <a:r>
-              <a:rPr kumimoji="1" lang="ja-JP" altLang="en-US"/>
+              <a:rPr lang="ja-JP" altLang="en-US"/>
               <a:t>マスター テキストの書式設定</a:t>
             </a:r>
           </a:p>
           <a:p>
             <a:pPr lvl="1"/>
             <a:r>
-              <a:rPr kumimoji="1" lang="ja-JP" altLang="en-US"/>
+              <a:rPr lang="ja-JP" altLang="en-US"/>
               <a:t>第 </a:t>
             </a:r>
             <a:r>
-              <a:rPr kumimoji="1" lang="en-US" altLang="ja-JP"/>
+              <a:rPr lang="en-US" altLang="ja-JP"/>
               <a:t>2 </a:t>
             </a:r>
             <a:r>
-              <a:rPr kumimoji="1" lang="ja-JP" altLang="en-US"/>
+              <a:rPr lang="ja-JP" altLang="en-US"/>
               <a:t>レベル</a:t>
             </a:r>
           </a:p>
           <a:p>
             <a:pPr lvl="2"/>
             <a:r>
-              <a:rPr kumimoji="1" lang="ja-JP" altLang="en-US"/>
+              <a:rPr lang="ja-JP" altLang="en-US"/>
               <a:t>第 </a:t>
             </a:r>
             <a:r>
-              <a:rPr kumimoji="1" lang="en-US" altLang="ja-JP"/>
+              <a:rPr lang="en-US" altLang="ja-JP"/>
               <a:t>3 </a:t>
             </a:r>
             <a:r>
-              <a:rPr kumimoji="1" lang="ja-JP" altLang="en-US"/>
+              <a:rPr lang="ja-JP" altLang="en-US"/>
               <a:t>レベル</a:t>
             </a:r>
           </a:p>
           <a:p>
             <a:pPr lvl="3"/>
             <a:r>
-              <a:rPr kumimoji="1" lang="ja-JP" altLang="en-US"/>
+              <a:rPr lang="ja-JP" altLang="en-US"/>
               <a:t>第 </a:t>
             </a:r>
             <a:r>
-              <a:rPr kumimoji="1" lang="en-US" altLang="ja-JP"/>
+              <a:rPr lang="en-US" altLang="ja-JP"/>
               <a:t>4 </a:t>
             </a:r>
             <a:r>
-              <a:rPr kumimoji="1" lang="ja-JP" altLang="en-US"/>
+              <a:rPr lang="ja-JP" altLang="en-US"/>
               <a:t>レベル</a:t>
             </a:r>
           </a:p>
           <a:p>
             <a:pPr lvl="4"/>
             <a:r>
-              <a:rPr kumimoji="1" lang="ja-JP" altLang="en-US"/>
+              <a:rPr lang="ja-JP" altLang="en-US"/>
               <a:t>第 </a:t>
             </a:r>
             <a:r>
-              <a:rPr kumimoji="1" lang="en-US" altLang="ja-JP"/>
+              <a:rPr lang="en-US" altLang="ja-JP"/>
               <a:t>5 </a:t>
             </a:r>
             <a:r>
-              <a:rPr kumimoji="1" lang="ja-JP" altLang="en-US"/>
+              <a:rPr lang="ja-JP" altLang="en-US"/>
               <a:t>レベル</a:t>
             </a:r>
-          </a:p>
-        </p:txBody>
-      </p:sp>
-      <p:sp>
-        <p:nvSpPr>
-          <p:cNvPr id="4" name="日付プレースホルダー 3">
-            <a:extLst>
-              <a:ext uri="{FF2B5EF4-FFF2-40B4-BE49-F238E27FC236}">
-                <a16:creationId xmlns:a16="http://schemas.microsoft.com/office/drawing/2014/main" id="{B218A881-D882-CACF-FC3F-08ACC0205A17}"/>
-              </a:ext>
-            </a:extLst>
-          </p:cNvPr>
+            <a:endParaRPr lang="en-US" dirty="0"/>
+          </a:p>
+        </p:txBody>
+      </p:sp>
+      <p:sp>
+        <p:nvSpPr>
+          <p:cNvPr id="4" name="Date Placeholder 3"/>
           <p:cNvSpPr>
             <a:spLocks noGrp="1"/>
           </p:cNvSpPr>
@@ -3172,8 +2841,8 @@
         </p:nvSpPr>
         <p:spPr>
           <a:xfrm>
-            <a:off x="838200" y="6356350"/>
-            <a:ext cx="2743200" cy="365125"/>
+            <a:off x="681038" y="6356352"/>
+            <a:ext cx="2228850" cy="365125"/>
           </a:xfrm>
           <a:prstGeom prst="rect">
             <a:avLst/>
@@ -3195,7 +2864,7 @@
           <a:p>
             <a:fld id="{DB63C96E-B3B7-45DC-B917-3CA8BDCF5939}" type="datetimeFigureOut">
               <a:rPr kumimoji="1" lang="ja-JP" altLang="en-US" smtClean="0"/>
-              <a:t>2025/2/18</a:t>
+              <a:t>2025/2/24</a:t>
             </a:fld>
             <a:endParaRPr kumimoji="1" lang="ja-JP" altLang="en-US"/>
           </a:p>
@@ -3203,13 +2872,7 @@
       </p:sp>
       <p:sp>
         <p:nvSpPr>
-          <p:cNvPr id="5" name="フッター プレースホルダー 4">
-            <a:extLst>
-              <a:ext uri="{FF2B5EF4-FFF2-40B4-BE49-F238E27FC236}">
-                <a16:creationId xmlns:a16="http://schemas.microsoft.com/office/drawing/2014/main" id="{45A39A23-30A5-12CA-63C6-5DE05ED7602D}"/>
-              </a:ext>
-            </a:extLst>
-          </p:cNvPr>
+          <p:cNvPr id="5" name="Footer Placeholder 4"/>
           <p:cNvSpPr>
             <a:spLocks noGrp="1"/>
           </p:cNvSpPr>
@@ -3219,8 +2882,8 @@
         </p:nvSpPr>
         <p:spPr>
           <a:xfrm>
-            <a:off x="4038600" y="6356350"/>
-            <a:ext cx="4114800" cy="365125"/>
+            <a:off x="3281363" y="6356352"/>
+            <a:ext cx="3343275" cy="365125"/>
           </a:xfrm>
           <a:prstGeom prst="rect">
             <a:avLst/>
@@ -3246,13 +2909,7 @@
       </p:sp>
       <p:sp>
         <p:nvSpPr>
-          <p:cNvPr id="6" name="スライド番号プレースホルダー 5">
-            <a:extLst>
-              <a:ext uri="{FF2B5EF4-FFF2-40B4-BE49-F238E27FC236}">
-                <a16:creationId xmlns:a16="http://schemas.microsoft.com/office/drawing/2014/main" id="{B9E8667E-67F9-434C-D660-4C1E171759F5}"/>
-              </a:ext>
-            </a:extLst>
-          </p:cNvPr>
+          <p:cNvPr id="6" name="Slide Number Placeholder 5"/>
           <p:cNvSpPr>
             <a:spLocks noGrp="1"/>
           </p:cNvSpPr>
@@ -3262,8 +2919,8 @@
         </p:nvSpPr>
         <p:spPr>
           <a:xfrm>
-            <a:off x="8610600" y="6356350"/>
-            <a:ext cx="2743200" cy="365125"/>
+            <a:off x="6996113" y="6356352"/>
+            <a:ext cx="2228850" cy="365125"/>
           </a:xfrm>
           <a:prstGeom prst="rect">
             <a:avLst/>
@@ -3294,23 +2951,23 @@
     </p:spTree>
     <p:extLst>
       <p:ext uri="{BB962C8B-B14F-4D97-AF65-F5344CB8AC3E}">
-        <p14:creationId xmlns:p14="http://schemas.microsoft.com/office/powerpoint/2010/main" val="3906945046"/>
+        <p14:creationId xmlns:p14="http://schemas.microsoft.com/office/powerpoint/2010/main" val="2460850006"/>
       </p:ext>
     </p:extLst>
   </p:cSld>
   <p:clrMap bg1="lt1" tx1="dk1" bg2="lt2" tx2="dk2" accent1="accent1" accent2="accent2" accent3="accent3" accent4="accent4" accent5="accent5" accent6="accent6" hlink="hlink" folHlink="folHlink"/>
   <p:sldLayoutIdLst>
-    <p:sldLayoutId id="2147483649" r:id="rId1"/>
-    <p:sldLayoutId id="2147483650" r:id="rId2"/>
-    <p:sldLayoutId id="2147483651" r:id="rId3"/>
-    <p:sldLayoutId id="2147483652" r:id="rId4"/>
-    <p:sldLayoutId id="2147483653" r:id="rId5"/>
-    <p:sldLayoutId id="2147483654" r:id="rId6"/>
-    <p:sldLayoutId id="2147483655" r:id="rId7"/>
-    <p:sldLayoutId id="2147483656" r:id="rId8"/>
-    <p:sldLayoutId id="2147483657" r:id="rId9"/>
-    <p:sldLayoutId id="2147483658" r:id="rId10"/>
-    <p:sldLayoutId id="2147483659" r:id="rId11"/>
+    <p:sldLayoutId id="2147483661" r:id="rId1"/>
+    <p:sldLayoutId id="2147483662" r:id="rId2"/>
+    <p:sldLayoutId id="2147483663" r:id="rId3"/>
+    <p:sldLayoutId id="2147483664" r:id="rId4"/>
+    <p:sldLayoutId id="2147483665" r:id="rId5"/>
+    <p:sldLayoutId id="2147483666" r:id="rId6"/>
+    <p:sldLayoutId id="2147483667" r:id="rId7"/>
+    <p:sldLayoutId id="2147483668" r:id="rId8"/>
+    <p:sldLayoutId id="2147483669" r:id="rId9"/>
+    <p:sldLayoutId id="2147483670" r:id="rId10"/>
+    <p:sldLayoutId id="2147483671" r:id="rId11"/>
   </p:sldLayoutIdLst>
   <p:txStyles>
     <p:titleStyle>
@@ -3498,7 +3155,7 @@
     </p:bodyStyle>
     <p:otherStyle>
       <a:defPPr>
-        <a:defRPr lang="ja-JP"/>
+        <a:defRPr lang="en-US"/>
       </a:defPPr>
       <a:lvl1pPr marL="0" algn="l" defTabSz="914400" rtl="0" eaLnBrk="1" latinLnBrk="0" hangingPunct="1">
         <a:defRPr kumimoji="1" sz="1800" kern="1200">
@@ -3612,6 +3269,605 @@
           <a:chExt cx="0" cy="0"/>
         </a:xfrm>
       </p:grpSpPr>
+      <p:pic>
+        <p:nvPicPr>
+          <p:cNvPr id="9" name="図 8" descr="テキスト, ホワイトボード&#10;&#10;自動的に生成された説明">
+            <a:extLst>
+              <a:ext uri="{FF2B5EF4-FFF2-40B4-BE49-F238E27FC236}">
+                <a16:creationId xmlns:a16="http://schemas.microsoft.com/office/drawing/2014/main" id="{CC27AA92-79E0-92C0-6D79-5C2D7332BD93}"/>
+              </a:ext>
+            </a:extLst>
+          </p:cNvPr>
+          <p:cNvPicPr>
+            <a:picLocks noChangeAspect="1"/>
+          </p:cNvPicPr>
+          <p:nvPr/>
+        </p:nvPicPr>
+        <p:blipFill>
+          <a:blip r:embed="rId2">
+            <a:extLst>
+              <a:ext uri="{28A0092B-C50C-407E-A947-70E740481C1C}">
+                <a14:useLocalDpi xmlns:a14="http://schemas.microsoft.com/office/drawing/2010/main" val="0"/>
+              </a:ext>
+            </a:extLst>
+          </a:blip>
+          <a:srcRect l="37578" t="19090" r="35288" b="34742"/>
+          <a:stretch/>
+        </p:blipFill>
+        <p:spPr>
+          <a:xfrm>
+            <a:off x="257218" y="1983583"/>
+            <a:ext cx="3453127" cy="3916911"/>
+          </a:xfrm>
+          <a:prstGeom prst="rect">
+            <a:avLst/>
+          </a:prstGeom>
+          <a:ln>
+            <a:noFill/>
+          </a:ln>
+          <a:effectLst>
+            <a:reflection blurRad="12700" stA="30000" endPos="30000" dist="5000" dir="5400000" sy="-100000" algn="bl" rotWithShape="0"/>
+          </a:effectLst>
+          <a:scene3d>
+            <a:camera prst="perspectiveContrastingLeftFacing">
+              <a:rot lat="300000" lon="19800000" rev="0"/>
+            </a:camera>
+            <a:lightRig rig="threePt" dir="t">
+              <a:rot lat="0" lon="0" rev="2700000"/>
+            </a:lightRig>
+          </a:scene3d>
+          <a:sp3d>
+            <a:bevelT w="63500" h="50800"/>
+          </a:sp3d>
+        </p:spPr>
+      </p:pic>
+      <p:sp>
+        <p:nvSpPr>
+          <p:cNvPr id="2" name="タイトル 1">
+            <a:extLst>
+              <a:ext uri="{FF2B5EF4-FFF2-40B4-BE49-F238E27FC236}">
+                <a16:creationId xmlns:a16="http://schemas.microsoft.com/office/drawing/2014/main" id="{B8F98664-E6B6-AF55-79DE-520C54818A8A}"/>
+              </a:ext>
+            </a:extLst>
+          </p:cNvPr>
+          <p:cNvSpPr>
+            <a:spLocks noGrp="1"/>
+          </p:cNvSpPr>
+          <p:nvPr>
+            <p:ph type="ctrTitle"/>
+          </p:nvPr>
+        </p:nvSpPr>
+        <p:spPr>
+          <a:xfrm>
+            <a:off x="1238250" y="216144"/>
+            <a:ext cx="7429500" cy="1009329"/>
+          </a:xfrm>
+          <a:effectLst>
+            <a:outerShdw blurRad="76200" dist="12700" dir="2700000" sy="-23000" kx="-800400" algn="bl" rotWithShape="0">
+              <a:prstClr val="black">
+                <a:alpha val="20000"/>
+              </a:prstClr>
+            </a:outerShdw>
+          </a:effectLst>
+        </p:spPr>
+        <p:txBody>
+          <a:bodyPr>
+            <a:normAutofit/>
+          </a:bodyPr>
+          <a:lstStyle/>
+          <a:p>
+            <a:r>
+              <a:rPr lang="ja-JP" altLang="en-US" sz="5850" b="1" dirty="0">
+                <a:ln w="25400">
+                  <a:solidFill>
+                    <a:schemeClr val="tx1"/>
+                  </a:solidFill>
+                </a:ln>
+                <a:gradFill flip="none" rotWithShape="1">
+                  <a:gsLst>
+                    <a:gs pos="0">
+                      <a:srgbClr val="7030A0"/>
+                    </a:gs>
+                    <a:gs pos="66466">
+                      <a:srgbClr val="FFFF00"/>
+                    </a:gs>
+                    <a:gs pos="55876">
+                      <a:srgbClr val="92D050"/>
+                    </a:gs>
+                    <a:gs pos="45878">
+                      <a:srgbClr val="00B050"/>
+                    </a:gs>
+                    <a:gs pos="34000">
+                      <a:srgbClr val="00B0F0"/>
+                    </a:gs>
+                    <a:gs pos="24000">
+                      <a:srgbClr val="0070C0"/>
+                    </a:gs>
+                    <a:gs pos="11000">
+                      <a:srgbClr val="002060"/>
+                    </a:gs>
+                    <a:gs pos="77000">
+                      <a:srgbClr val="FFC000"/>
+                    </a:gs>
+                    <a:gs pos="95000">
+                      <a:srgbClr val="FF0000"/>
+                    </a:gs>
+                    <a:gs pos="100000">
+                      <a:srgbClr val="C00000"/>
+                    </a:gs>
+                  </a:gsLst>
+                  <a:lin ang="10800000" scaled="1"/>
+                  <a:tileRect/>
+                </a:gradFill>
+                <a:effectLst>
+                  <a:outerShdw blurRad="75057" dist="203200" dir="7380000" sx="101000" sy="101000" rotWithShape="0">
+                    <a:prstClr val="black">
+                      <a:alpha val="71000"/>
+                    </a:prstClr>
+                  </a:outerShdw>
+                </a:effectLst>
+                <a:latin typeface="HG創英角ﾎﾟｯﾌﾟ体" panose="040B0A09000000000000" pitchFamily="49" charset="-128"/>
+                <a:ea typeface="HG創英角ﾎﾟｯﾌﾟ体" panose="040B0A09000000000000" pitchFamily="49" charset="-128"/>
+              </a:rPr>
+              <a:t>学習駆動コース</a:t>
+            </a:r>
+          </a:p>
+        </p:txBody>
+      </p:sp>
+      <p:sp>
+        <p:nvSpPr>
+          <p:cNvPr id="5" name="タイトル 1">
+            <a:extLst>
+              <a:ext uri="{FF2B5EF4-FFF2-40B4-BE49-F238E27FC236}">
+                <a16:creationId xmlns:a16="http://schemas.microsoft.com/office/drawing/2014/main" id="{E3CB6ABF-CB6C-9805-6587-7313163F1A6D}"/>
+              </a:ext>
+            </a:extLst>
+          </p:cNvPr>
+          <p:cNvSpPr txBox="1">
+            <a:spLocks/>
+          </p:cNvSpPr>
+          <p:nvPr/>
+        </p:nvSpPr>
+        <p:spPr>
+          <a:xfrm>
+            <a:off x="1371199" y="1176550"/>
+            <a:ext cx="7429500" cy="1009329"/>
+          </a:xfrm>
+          <a:prstGeom prst="rect">
+            <a:avLst/>
+          </a:prstGeom>
+          <a:effectLst>
+            <a:outerShdw blurRad="76200" dist="12700" dir="2700000" sy="-23000" kx="-800400" algn="bl" rotWithShape="0">
+              <a:prstClr val="black">
+                <a:alpha val="20000"/>
+              </a:prstClr>
+            </a:outerShdw>
+          </a:effectLst>
+        </p:spPr>
+        <p:txBody>
+          <a:bodyPr vert="horz" lIns="74295" tIns="37148" rIns="74295" bIns="37148" rtlCol="0" anchor="b">
+            <a:normAutofit/>
+          </a:bodyPr>
+          <a:lstStyle>
+            <a:lvl1pPr algn="ctr" defTabSz="914400" rtl="0" eaLnBrk="1" latinLnBrk="0" hangingPunct="1">
+              <a:lnSpc>
+                <a:spcPct val="90000"/>
+              </a:lnSpc>
+              <a:spcBef>
+                <a:spcPct val="0"/>
+              </a:spcBef>
+              <a:buNone/>
+              <a:defRPr kumimoji="1" sz="6000" kern="1200">
+                <a:solidFill>
+                  <a:schemeClr val="tx1"/>
+                </a:solidFill>
+                <a:latin typeface="+mj-lt"/>
+                <a:ea typeface="+mj-ea"/>
+                <a:cs typeface="+mj-cs"/>
+              </a:defRPr>
+            </a:lvl1pPr>
+          </a:lstStyle>
+          <a:p>
+            <a:r>
+              <a:rPr lang="ja-JP" altLang="en-US" sz="5850" b="1" dirty="0">
+                <a:ln w="25400">
+                  <a:solidFill>
+                    <a:schemeClr val="tx1"/>
+                  </a:solidFill>
+                </a:ln>
+                <a:gradFill flip="none" rotWithShape="1">
+                  <a:gsLst>
+                    <a:gs pos="0">
+                      <a:srgbClr val="7030A0"/>
+                    </a:gs>
+                    <a:gs pos="66466">
+                      <a:srgbClr val="FFFF00"/>
+                    </a:gs>
+                    <a:gs pos="55876">
+                      <a:srgbClr val="92D050"/>
+                    </a:gs>
+                    <a:gs pos="45878">
+                      <a:srgbClr val="00B050"/>
+                    </a:gs>
+                    <a:gs pos="34000">
+                      <a:srgbClr val="00B0F0"/>
+                    </a:gs>
+                    <a:gs pos="24000">
+                      <a:srgbClr val="0070C0"/>
+                    </a:gs>
+                    <a:gs pos="11000">
+                      <a:srgbClr val="002060"/>
+                    </a:gs>
+                    <a:gs pos="77000">
+                      <a:srgbClr val="FFC000"/>
+                    </a:gs>
+                    <a:gs pos="95000">
+                      <a:srgbClr val="FF0000"/>
+                    </a:gs>
+                    <a:gs pos="100000">
+                      <a:srgbClr val="C00000"/>
+                    </a:gs>
+                  </a:gsLst>
+                  <a:lin ang="10800000" scaled="1"/>
+                  <a:tileRect/>
+                </a:gradFill>
+                <a:effectLst>
+                  <a:outerShdw blurRad="75057" dist="203200" dir="7380000" sx="101000" sy="101000" rotWithShape="0">
+                    <a:prstClr val="black">
+                      <a:alpha val="71000"/>
+                    </a:prstClr>
+                  </a:outerShdw>
+                </a:effectLst>
+                <a:latin typeface="HG創英角ﾎﾟｯﾌﾟ体" panose="040B0A09000000000000" pitchFamily="49" charset="-128"/>
+                <a:ea typeface="HG創英角ﾎﾟｯﾌﾟ体" panose="040B0A09000000000000" pitchFamily="49" charset="-128"/>
+              </a:rPr>
+              <a:t>コンテンツゼミ</a:t>
+            </a:r>
+          </a:p>
+        </p:txBody>
+      </p:sp>
+      <p:sp>
+        <p:nvSpPr>
+          <p:cNvPr id="7" name="スマイル 6">
+            <a:extLst>
+              <a:ext uri="{FF2B5EF4-FFF2-40B4-BE49-F238E27FC236}">
+                <a16:creationId xmlns:a16="http://schemas.microsoft.com/office/drawing/2014/main" id="{B920B5AD-1B99-726C-0FBB-E84F5F6539CB}"/>
+              </a:ext>
+            </a:extLst>
+          </p:cNvPr>
+          <p:cNvSpPr/>
+          <p:nvPr/>
+        </p:nvSpPr>
+        <p:spPr>
+          <a:xfrm rot="19027647">
+            <a:off x="8466652" y="5347580"/>
+            <a:ext cx="1365613" cy="1202871"/>
+          </a:xfrm>
+          <a:prstGeom prst="smileyFace">
+            <a:avLst/>
+          </a:prstGeom>
+          <a:solidFill>
+            <a:srgbClr val="FFFF00"/>
+          </a:solidFill>
+          <a:effectLst>
+            <a:outerShdw blurRad="50800" dist="38100" dir="2700000" algn="tl" rotWithShape="0">
+              <a:prstClr val="black">
+                <a:alpha val="40000"/>
+              </a:prstClr>
+            </a:outerShdw>
+          </a:effectLst>
+        </p:spPr>
+        <p:style>
+          <a:lnRef idx="2">
+            <a:schemeClr val="accent1">
+              <a:shade val="15000"/>
+            </a:schemeClr>
+          </a:lnRef>
+          <a:fillRef idx="1">
+            <a:schemeClr val="accent1"/>
+          </a:fillRef>
+          <a:effectRef idx="0">
+            <a:schemeClr val="accent1"/>
+          </a:effectRef>
+          <a:fontRef idx="minor">
+            <a:schemeClr val="lt1"/>
+          </a:fontRef>
+        </p:style>
+        <p:txBody>
+          <a:bodyPr rtlCol="0" anchor="ctr"/>
+          <a:lstStyle/>
+          <a:p>
+            <a:pPr algn="ctr"/>
+            <a:endParaRPr lang="ja-JP" altLang="en-US" sz="1463"/>
+          </a:p>
+        </p:txBody>
+      </p:sp>
+      <p:sp>
+        <p:nvSpPr>
+          <p:cNvPr id="8" name="吹き出し: 角を丸めた四角形 22">
+            <a:extLst>
+              <a:ext uri="{FF2B5EF4-FFF2-40B4-BE49-F238E27FC236}">
+                <a16:creationId xmlns:a16="http://schemas.microsoft.com/office/drawing/2014/main" id="{630BAE6D-7FBA-0F21-4E29-8761263207CC}"/>
+              </a:ext>
+            </a:extLst>
+          </p:cNvPr>
+          <p:cNvSpPr/>
+          <p:nvPr/>
+        </p:nvSpPr>
+        <p:spPr>
+          <a:xfrm>
+            <a:off x="5090474" y="3187637"/>
+            <a:ext cx="2800307" cy="1009329"/>
+          </a:xfrm>
+          <a:prstGeom prst="wedgeRoundRectCallout">
+            <a:avLst>
+              <a:gd name="adj1" fmla="val 36857"/>
+              <a:gd name="adj2" fmla="val 101761"/>
+              <a:gd name="adj3" fmla="val 16667"/>
+            </a:avLst>
+          </a:prstGeom>
+          <a:solidFill>
+            <a:schemeClr val="bg1"/>
+          </a:solidFill>
+          <a:ln w="19050">
+            <a:solidFill>
+              <a:schemeClr val="tx1">
+                <a:lumMod val="95000"/>
+                <a:lumOff val="5000"/>
+              </a:schemeClr>
+            </a:solidFill>
+          </a:ln>
+          <a:effectLst>
+            <a:outerShdw blurRad="50800" dist="127000" dir="18480000" algn="tl" rotWithShape="0">
+              <a:prstClr val="black"/>
+            </a:outerShdw>
+          </a:effectLst>
+        </p:spPr>
+        <p:style>
+          <a:lnRef idx="3">
+            <a:schemeClr val="lt1"/>
+          </a:lnRef>
+          <a:fillRef idx="1">
+            <a:schemeClr val="accent5"/>
+          </a:fillRef>
+          <a:effectRef idx="1">
+            <a:schemeClr val="accent5"/>
+          </a:effectRef>
+          <a:fontRef idx="minor">
+            <a:schemeClr val="lt1"/>
+          </a:fontRef>
+        </p:style>
+        <p:txBody>
+          <a:bodyPr rtlCol="0" anchor="ctr"/>
+          <a:lstStyle/>
+          <a:p>
+            <a:pPr algn="ctr"/>
+            <a:r>
+              <a:rPr lang="ja-JP" altLang="en-US" sz="2275" b="1" dirty="0">
+                <a:solidFill>
+                  <a:srgbClr val="FF0000"/>
+                </a:solidFill>
+              </a:rPr>
+              <a:t>たのしいよ</a:t>
+            </a:r>
+            <a:endParaRPr lang="ja-JP" altLang="en-US" sz="2275" dirty="0">
+              <a:solidFill>
+                <a:srgbClr val="FF0000"/>
+              </a:solidFill>
+            </a:endParaRPr>
+          </a:p>
+        </p:txBody>
+      </p:sp>
+      <p:sp>
+        <p:nvSpPr>
+          <p:cNvPr id="10" name="スマイル 9">
+            <a:extLst>
+              <a:ext uri="{FF2B5EF4-FFF2-40B4-BE49-F238E27FC236}">
+                <a16:creationId xmlns:a16="http://schemas.microsoft.com/office/drawing/2014/main" id="{62E19BDF-9EE7-93B1-0DAB-FD4FCB2553DD}"/>
+              </a:ext>
+            </a:extLst>
+          </p:cNvPr>
+          <p:cNvSpPr/>
+          <p:nvPr/>
+        </p:nvSpPr>
+        <p:spPr>
+          <a:xfrm rot="2761819">
+            <a:off x="6795338" y="5347580"/>
+            <a:ext cx="1365613" cy="1202871"/>
+          </a:xfrm>
+          <a:prstGeom prst="smileyFace">
+            <a:avLst/>
+          </a:prstGeom>
+          <a:solidFill>
+            <a:srgbClr val="FFFF00"/>
+          </a:solidFill>
+          <a:effectLst>
+            <a:outerShdw blurRad="50800" dist="38100" dir="2700000" algn="tl" rotWithShape="0">
+              <a:prstClr val="black">
+                <a:alpha val="40000"/>
+              </a:prstClr>
+            </a:outerShdw>
+          </a:effectLst>
+        </p:spPr>
+        <p:style>
+          <a:lnRef idx="2">
+            <a:schemeClr val="accent1">
+              <a:shade val="15000"/>
+            </a:schemeClr>
+          </a:lnRef>
+          <a:fillRef idx="1">
+            <a:schemeClr val="accent1"/>
+          </a:fillRef>
+          <a:effectRef idx="0">
+            <a:schemeClr val="accent1"/>
+          </a:effectRef>
+          <a:fontRef idx="minor">
+            <a:schemeClr val="lt1"/>
+          </a:fontRef>
+        </p:style>
+        <p:txBody>
+          <a:bodyPr rtlCol="0" anchor="ctr"/>
+          <a:lstStyle/>
+          <a:p>
+            <a:pPr algn="ctr"/>
+            <a:endParaRPr lang="ja-JP" altLang="en-US" sz="1463"/>
+          </a:p>
+        </p:txBody>
+      </p:sp>
+      <p:sp>
+        <p:nvSpPr>
+          <p:cNvPr id="11" name="スマイル 10">
+            <a:extLst>
+              <a:ext uri="{FF2B5EF4-FFF2-40B4-BE49-F238E27FC236}">
+                <a16:creationId xmlns:a16="http://schemas.microsoft.com/office/drawing/2014/main" id="{B34E26D0-0E3C-6852-0F00-30DC6B81C680}"/>
+              </a:ext>
+            </a:extLst>
+          </p:cNvPr>
+          <p:cNvSpPr/>
+          <p:nvPr/>
+        </p:nvSpPr>
+        <p:spPr>
+          <a:xfrm rot="10800000">
+            <a:off x="7674546" y="4287854"/>
+            <a:ext cx="1365613" cy="1202871"/>
+          </a:xfrm>
+          <a:prstGeom prst="smileyFace">
+            <a:avLst/>
+          </a:prstGeom>
+          <a:solidFill>
+            <a:srgbClr val="FFFF00"/>
+          </a:solidFill>
+          <a:effectLst>
+            <a:outerShdw blurRad="50800" dist="38100" dir="2700000" algn="tl" rotWithShape="0">
+              <a:prstClr val="black">
+                <a:alpha val="40000"/>
+              </a:prstClr>
+            </a:outerShdw>
+          </a:effectLst>
+        </p:spPr>
+        <p:style>
+          <a:lnRef idx="2">
+            <a:schemeClr val="accent1">
+              <a:shade val="15000"/>
+            </a:schemeClr>
+          </a:lnRef>
+          <a:fillRef idx="1">
+            <a:schemeClr val="accent1"/>
+          </a:fillRef>
+          <a:effectRef idx="0">
+            <a:schemeClr val="accent1"/>
+          </a:effectRef>
+          <a:fontRef idx="minor">
+            <a:schemeClr val="lt1"/>
+          </a:fontRef>
+        </p:style>
+        <p:txBody>
+          <a:bodyPr rtlCol="0" anchor="ctr"/>
+          <a:lstStyle/>
+          <a:p>
+            <a:pPr algn="ctr"/>
+            <a:endParaRPr lang="ja-JP" altLang="en-US" sz="1463" dirty="0"/>
+          </a:p>
+        </p:txBody>
+      </p:sp>
+      <p:sp>
+        <p:nvSpPr>
+          <p:cNvPr id="13" name="稲妻 12">
+            <a:extLst>
+              <a:ext uri="{FF2B5EF4-FFF2-40B4-BE49-F238E27FC236}">
+                <a16:creationId xmlns:a16="http://schemas.microsoft.com/office/drawing/2014/main" id="{3E863D6E-D805-E4FC-D90F-44E503673C0C}"/>
+              </a:ext>
+            </a:extLst>
+          </p:cNvPr>
+          <p:cNvSpPr/>
+          <p:nvPr/>
+        </p:nvSpPr>
+        <p:spPr>
+          <a:xfrm>
+            <a:off x="990575" y="180212"/>
+            <a:ext cx="993207" cy="1767439"/>
+          </a:xfrm>
+          <a:prstGeom prst="lightningBolt">
+            <a:avLst/>
+          </a:prstGeom>
+          <a:solidFill>
+            <a:schemeClr val="accent5"/>
+          </a:solidFill>
+        </p:spPr>
+        <p:style>
+          <a:lnRef idx="2">
+            <a:schemeClr val="accent1">
+              <a:shade val="15000"/>
+            </a:schemeClr>
+          </a:lnRef>
+          <a:fillRef idx="1">
+            <a:schemeClr val="accent1"/>
+          </a:fillRef>
+          <a:effectRef idx="0">
+            <a:schemeClr val="accent1"/>
+          </a:effectRef>
+          <a:fontRef idx="minor">
+            <a:schemeClr val="lt1"/>
+          </a:fontRef>
+        </p:style>
+        <p:txBody>
+          <a:bodyPr rtlCol="0" anchor="ctr"/>
+          <a:lstStyle/>
+          <a:p>
+            <a:pPr algn="ctr"/>
+            <a:endParaRPr lang="ja-JP" altLang="en-US" sz="1463"/>
+          </a:p>
+        </p:txBody>
+      </p:sp>
+      <p:sp>
+        <p:nvSpPr>
+          <p:cNvPr id="14" name="稲妻 13">
+            <a:extLst>
+              <a:ext uri="{FF2B5EF4-FFF2-40B4-BE49-F238E27FC236}">
+                <a16:creationId xmlns:a16="http://schemas.microsoft.com/office/drawing/2014/main" id="{AB80AE40-809F-3520-C7A4-7325E532BB8F}"/>
+              </a:ext>
+            </a:extLst>
+          </p:cNvPr>
+          <p:cNvSpPr/>
+          <p:nvPr/>
+        </p:nvSpPr>
+        <p:spPr>
+          <a:xfrm flipH="1">
+            <a:off x="7674546" y="341750"/>
+            <a:ext cx="993207" cy="1767439"/>
+          </a:xfrm>
+          <a:prstGeom prst="lightningBolt">
+            <a:avLst/>
+          </a:prstGeom>
+          <a:solidFill>
+            <a:srgbClr val="FF0000"/>
+          </a:solidFill>
+        </p:spPr>
+        <p:style>
+          <a:lnRef idx="2">
+            <a:schemeClr val="accent1">
+              <a:shade val="15000"/>
+            </a:schemeClr>
+          </a:lnRef>
+          <a:fillRef idx="1">
+            <a:schemeClr val="accent1"/>
+          </a:fillRef>
+          <a:effectRef idx="0">
+            <a:schemeClr val="accent1"/>
+          </a:effectRef>
+          <a:fontRef idx="minor">
+            <a:schemeClr val="lt1"/>
+          </a:fontRef>
+        </p:style>
+        <p:txBody>
+          <a:bodyPr rtlCol="0" anchor="ctr"/>
+          <a:lstStyle/>
+          <a:p>
+            <a:pPr algn="ctr"/>
+            <a:endParaRPr lang="ja-JP" altLang="en-US" sz="1463"/>
+          </a:p>
+        </p:txBody>
+      </p:sp>
       <p:sp>
         <p:nvSpPr>
           <p:cNvPr id="6" name="爆発: 8 pt 5">
@@ -3626,8 +3882,8 @@
         </p:nvSpPr>
         <p:spPr>
           <a:xfrm>
-            <a:off x="3522931" y="3834224"/>
-            <a:ext cx="4360245" cy="3128210"/>
+            <a:off x="2973080" y="3855226"/>
+            <a:ext cx="4072508" cy="3002774"/>
           </a:xfrm>
           <a:prstGeom prst="irregularSeal1">
             <a:avLst/>
@@ -3695,612 +3951,13 @@
           <a:p>
             <a:pPr algn="ctr"/>
             <a:r>
-              <a:rPr kumimoji="1" lang="ja-JP" altLang="en-US" sz="3600" b="1" i="1" dirty="0">
+              <a:rPr lang="ja-JP" altLang="en-US" sz="2925" b="1" i="1" dirty="0">
                 <a:solidFill>
                   <a:srgbClr val="FF0000"/>
                 </a:solidFill>
               </a:rPr>
               <a:t>おもしろい！</a:t>
             </a:r>
-          </a:p>
-        </p:txBody>
-      </p:sp>
-      <p:sp>
-        <p:nvSpPr>
-          <p:cNvPr id="2" name="タイトル 1">
-            <a:extLst>
-              <a:ext uri="{FF2B5EF4-FFF2-40B4-BE49-F238E27FC236}">
-                <a16:creationId xmlns:a16="http://schemas.microsoft.com/office/drawing/2014/main" id="{B8F98664-E6B6-AF55-79DE-520C54818A8A}"/>
-              </a:ext>
-            </a:extLst>
-          </p:cNvPr>
-          <p:cNvSpPr>
-            <a:spLocks noGrp="1"/>
-          </p:cNvSpPr>
-          <p:nvPr>
-            <p:ph type="ctrTitle"/>
-          </p:nvPr>
-        </p:nvSpPr>
-        <p:spPr>
-          <a:xfrm>
-            <a:off x="1524000" y="65836"/>
-            <a:ext cx="9144000" cy="1242251"/>
-          </a:xfrm>
-          <a:effectLst>
-            <a:outerShdw blurRad="76200" dist="12700" dir="2700000" sy="-23000" kx="-800400" algn="bl" rotWithShape="0">
-              <a:prstClr val="black">
-                <a:alpha val="20000"/>
-              </a:prstClr>
-            </a:outerShdw>
-          </a:effectLst>
-        </p:spPr>
-        <p:txBody>
-          <a:bodyPr>
-            <a:normAutofit/>
-          </a:bodyPr>
-          <a:lstStyle/>
-          <a:p>
-            <a:r>
-              <a:rPr kumimoji="1" lang="ja-JP" altLang="en-US" sz="7200" b="1" dirty="0">
-                <a:ln w="25400">
-                  <a:solidFill>
-                    <a:schemeClr val="tx1"/>
-                  </a:solidFill>
-                </a:ln>
-                <a:gradFill flip="none" rotWithShape="1">
-                  <a:gsLst>
-                    <a:gs pos="0">
-                      <a:srgbClr val="7030A0"/>
-                    </a:gs>
-                    <a:gs pos="66466">
-                      <a:srgbClr val="FFFF00"/>
-                    </a:gs>
-                    <a:gs pos="55876">
-                      <a:srgbClr val="92D050"/>
-                    </a:gs>
-                    <a:gs pos="45878">
-                      <a:srgbClr val="00B050"/>
-                    </a:gs>
-                    <a:gs pos="34000">
-                      <a:srgbClr val="00B0F0"/>
-                    </a:gs>
-                    <a:gs pos="24000">
-                      <a:srgbClr val="0070C0"/>
-                    </a:gs>
-                    <a:gs pos="11000">
-                      <a:srgbClr val="002060"/>
-                    </a:gs>
-                    <a:gs pos="77000">
-                      <a:srgbClr val="FFC000"/>
-                    </a:gs>
-                    <a:gs pos="95000">
-                      <a:srgbClr val="FF0000"/>
-                    </a:gs>
-                    <a:gs pos="100000">
-                      <a:srgbClr val="C00000"/>
-                    </a:gs>
-                  </a:gsLst>
-                  <a:lin ang="10800000" scaled="1"/>
-                  <a:tileRect/>
-                </a:gradFill>
-                <a:effectLst>
-                  <a:outerShdw blurRad="75057" dist="203200" dir="7380000" sx="101000" sy="101000" rotWithShape="0">
-                    <a:prstClr val="black">
-                      <a:alpha val="71000"/>
-                    </a:prstClr>
-                  </a:outerShdw>
-                </a:effectLst>
-                <a:latin typeface="HG創英角ﾎﾟｯﾌﾟ体" panose="040B0A09000000000000" pitchFamily="49" charset="-128"/>
-                <a:ea typeface="HG創英角ﾎﾟｯﾌﾟ体" panose="040B0A09000000000000" pitchFamily="49" charset="-128"/>
-              </a:rPr>
-              <a:t>学習駆動コース</a:t>
-            </a:r>
-          </a:p>
-        </p:txBody>
-      </p:sp>
-      <p:sp>
-        <p:nvSpPr>
-          <p:cNvPr id="5" name="タイトル 1">
-            <a:extLst>
-              <a:ext uri="{FF2B5EF4-FFF2-40B4-BE49-F238E27FC236}">
-                <a16:creationId xmlns:a16="http://schemas.microsoft.com/office/drawing/2014/main" id="{E3CB6ABF-CB6C-9805-6587-7313163F1A6D}"/>
-              </a:ext>
-            </a:extLst>
-          </p:cNvPr>
-          <p:cNvSpPr txBox="1">
-            <a:spLocks/>
-          </p:cNvSpPr>
-          <p:nvPr/>
-        </p:nvSpPr>
-        <p:spPr>
-          <a:xfrm>
-            <a:off x="1687630" y="1247874"/>
-            <a:ext cx="9144000" cy="1242251"/>
-          </a:xfrm>
-          <a:prstGeom prst="rect">
-            <a:avLst/>
-          </a:prstGeom>
-          <a:effectLst>
-            <a:outerShdw blurRad="76200" dist="12700" dir="2700000" sy="-23000" kx="-800400" algn="bl" rotWithShape="0">
-              <a:prstClr val="black">
-                <a:alpha val="20000"/>
-              </a:prstClr>
-            </a:outerShdw>
-          </a:effectLst>
-        </p:spPr>
-        <p:txBody>
-          <a:bodyPr vert="horz" lIns="91440" tIns="45720" rIns="91440" bIns="45720" rtlCol="0" anchor="b">
-            <a:normAutofit/>
-          </a:bodyPr>
-          <a:lstStyle>
-            <a:lvl1pPr algn="ctr" defTabSz="914400" rtl="0" eaLnBrk="1" latinLnBrk="0" hangingPunct="1">
-              <a:lnSpc>
-                <a:spcPct val="90000"/>
-              </a:lnSpc>
-              <a:spcBef>
-                <a:spcPct val="0"/>
-              </a:spcBef>
-              <a:buNone/>
-              <a:defRPr kumimoji="1" sz="6000" kern="1200">
-                <a:solidFill>
-                  <a:schemeClr val="tx1"/>
-                </a:solidFill>
-                <a:latin typeface="+mj-lt"/>
-                <a:ea typeface="+mj-ea"/>
-                <a:cs typeface="+mj-cs"/>
-              </a:defRPr>
-            </a:lvl1pPr>
-          </a:lstStyle>
-          <a:p>
-            <a:r>
-              <a:rPr lang="ja-JP" altLang="en-US" sz="7200" b="1" dirty="0">
-                <a:ln w="25400">
-                  <a:solidFill>
-                    <a:schemeClr val="tx1"/>
-                  </a:solidFill>
-                </a:ln>
-                <a:gradFill flip="none" rotWithShape="1">
-                  <a:gsLst>
-                    <a:gs pos="0">
-                      <a:srgbClr val="7030A0"/>
-                    </a:gs>
-                    <a:gs pos="66466">
-                      <a:srgbClr val="FFFF00"/>
-                    </a:gs>
-                    <a:gs pos="55876">
-                      <a:srgbClr val="92D050"/>
-                    </a:gs>
-                    <a:gs pos="45878">
-                      <a:srgbClr val="00B050"/>
-                    </a:gs>
-                    <a:gs pos="34000">
-                      <a:srgbClr val="00B0F0"/>
-                    </a:gs>
-                    <a:gs pos="24000">
-                      <a:srgbClr val="0070C0"/>
-                    </a:gs>
-                    <a:gs pos="11000">
-                      <a:srgbClr val="002060"/>
-                    </a:gs>
-                    <a:gs pos="77000">
-                      <a:srgbClr val="FFC000"/>
-                    </a:gs>
-                    <a:gs pos="95000">
-                      <a:srgbClr val="FF0000"/>
-                    </a:gs>
-                    <a:gs pos="100000">
-                      <a:srgbClr val="C00000"/>
-                    </a:gs>
-                  </a:gsLst>
-                  <a:lin ang="10800000" scaled="1"/>
-                  <a:tileRect/>
-                </a:gradFill>
-                <a:effectLst>
-                  <a:outerShdw blurRad="75057" dist="203200" dir="7380000" sx="101000" sy="101000" rotWithShape="0">
-                    <a:prstClr val="black">
-                      <a:alpha val="71000"/>
-                    </a:prstClr>
-                  </a:outerShdw>
-                </a:effectLst>
-                <a:latin typeface="HG創英角ﾎﾟｯﾌﾟ体" panose="040B0A09000000000000" pitchFamily="49" charset="-128"/>
-                <a:ea typeface="HG創英角ﾎﾟｯﾌﾟ体" panose="040B0A09000000000000" pitchFamily="49" charset="-128"/>
-              </a:rPr>
-              <a:t>コンテンツゼミ</a:t>
-            </a:r>
-          </a:p>
-        </p:txBody>
-      </p:sp>
-      <p:sp>
-        <p:nvSpPr>
-          <p:cNvPr id="7" name="スマイル 6">
-            <a:extLst>
-              <a:ext uri="{FF2B5EF4-FFF2-40B4-BE49-F238E27FC236}">
-                <a16:creationId xmlns:a16="http://schemas.microsoft.com/office/drawing/2014/main" id="{B920B5AD-1B99-726C-0FBB-E84F5F6539CB}"/>
-              </a:ext>
-            </a:extLst>
-          </p:cNvPr>
-          <p:cNvSpPr/>
-          <p:nvPr/>
-        </p:nvSpPr>
-        <p:spPr>
-          <a:xfrm rot="19027647">
-            <a:off x="10316426" y="5152620"/>
-            <a:ext cx="1680754" cy="1480457"/>
-          </a:xfrm>
-          <a:prstGeom prst="smileyFace">
-            <a:avLst/>
-          </a:prstGeom>
-          <a:solidFill>
-            <a:srgbClr val="FFFF00"/>
-          </a:solidFill>
-          <a:effectLst>
-            <a:outerShdw blurRad="50800" dist="38100" dir="2700000" algn="tl" rotWithShape="0">
-              <a:prstClr val="black">
-                <a:alpha val="40000"/>
-              </a:prstClr>
-            </a:outerShdw>
-          </a:effectLst>
-        </p:spPr>
-        <p:style>
-          <a:lnRef idx="2">
-            <a:schemeClr val="accent1">
-              <a:shade val="15000"/>
-            </a:schemeClr>
-          </a:lnRef>
-          <a:fillRef idx="1">
-            <a:schemeClr val="accent1"/>
-          </a:fillRef>
-          <a:effectRef idx="0">
-            <a:schemeClr val="accent1"/>
-          </a:effectRef>
-          <a:fontRef idx="minor">
-            <a:schemeClr val="lt1"/>
-          </a:fontRef>
-        </p:style>
-        <p:txBody>
-          <a:bodyPr rtlCol="0" anchor="ctr"/>
-          <a:lstStyle/>
-          <a:p>
-            <a:pPr algn="ctr"/>
-            <a:endParaRPr kumimoji="1" lang="ja-JP" altLang="en-US"/>
-          </a:p>
-        </p:txBody>
-      </p:sp>
-      <p:sp>
-        <p:nvSpPr>
-          <p:cNvPr id="8" name="吹き出し: 角を丸めた四角形 22">
-            <a:extLst>
-              <a:ext uri="{FF2B5EF4-FFF2-40B4-BE49-F238E27FC236}">
-                <a16:creationId xmlns:a16="http://schemas.microsoft.com/office/drawing/2014/main" id="{630BAE6D-7FBA-0F21-4E29-8761263207CC}"/>
-              </a:ext>
-            </a:extLst>
-          </p:cNvPr>
-          <p:cNvSpPr/>
-          <p:nvPr/>
-        </p:nvSpPr>
-        <p:spPr>
-          <a:xfrm>
-            <a:off x="5790141" y="2947933"/>
-            <a:ext cx="3605106" cy="1029982"/>
-          </a:xfrm>
-          <a:prstGeom prst="wedgeRoundRectCallout">
-            <a:avLst>
-              <a:gd name="adj1" fmla="val 36857"/>
-              <a:gd name="adj2" fmla="val 101761"/>
-              <a:gd name="adj3" fmla="val 16667"/>
-            </a:avLst>
-          </a:prstGeom>
-          <a:solidFill>
-            <a:schemeClr val="bg1"/>
-          </a:solidFill>
-          <a:ln w="19050">
-            <a:solidFill>
-              <a:schemeClr val="tx1">
-                <a:lumMod val="95000"/>
-                <a:lumOff val="5000"/>
-              </a:schemeClr>
-            </a:solidFill>
-          </a:ln>
-          <a:effectLst>
-            <a:outerShdw blurRad="50800" dist="127000" dir="18480000" algn="tl" rotWithShape="0">
-              <a:prstClr val="black"/>
-            </a:outerShdw>
-          </a:effectLst>
-        </p:spPr>
-        <p:style>
-          <a:lnRef idx="3">
-            <a:schemeClr val="lt1"/>
-          </a:lnRef>
-          <a:fillRef idx="1">
-            <a:schemeClr val="accent5"/>
-          </a:fillRef>
-          <a:effectRef idx="1">
-            <a:schemeClr val="accent5"/>
-          </a:effectRef>
-          <a:fontRef idx="minor">
-            <a:schemeClr val="lt1"/>
-          </a:fontRef>
-        </p:style>
-        <p:txBody>
-          <a:bodyPr rtlCol="0" anchor="ctr"/>
-          <a:lstStyle/>
-          <a:p>
-            <a:pPr algn="ctr"/>
-            <a:r>
-              <a:rPr lang="ja-JP" altLang="en-US" sz="2800" b="1" dirty="0">
-                <a:solidFill>
-                  <a:srgbClr val="FF0000"/>
-                </a:solidFill>
-              </a:rPr>
-              <a:t>たのしいよ</a:t>
-            </a:r>
-            <a:endParaRPr kumimoji="1" lang="ja-JP" altLang="en-US" sz="2800" dirty="0">
-              <a:solidFill>
-                <a:srgbClr val="FF0000"/>
-              </a:solidFill>
-            </a:endParaRPr>
-          </a:p>
-        </p:txBody>
-      </p:sp>
-      <p:pic>
-        <p:nvPicPr>
-          <p:cNvPr id="9" name="図 8" descr="テキスト, ホワイトボード&#10;&#10;自動的に生成された説明">
-            <a:extLst>
-              <a:ext uri="{FF2B5EF4-FFF2-40B4-BE49-F238E27FC236}">
-                <a16:creationId xmlns:a16="http://schemas.microsoft.com/office/drawing/2014/main" id="{CC27AA92-79E0-92C0-6D79-5C2D7332BD93}"/>
-              </a:ext>
-            </a:extLst>
-          </p:cNvPr>
-          <p:cNvPicPr>
-            <a:picLocks noChangeAspect="1"/>
-          </p:cNvPicPr>
-          <p:nvPr/>
-        </p:nvPicPr>
-        <p:blipFill>
-          <a:blip r:embed="rId2">
-            <a:extLst>
-              <a:ext uri="{28A0092B-C50C-407E-A947-70E740481C1C}">
-                <a14:useLocalDpi xmlns:a14="http://schemas.microsoft.com/office/drawing/2010/main" val="0"/>
-              </a:ext>
-            </a:extLst>
-          </a:blip>
-          <a:srcRect l="37578" t="19090" r="35288" b="34742"/>
-          <a:stretch/>
-        </p:blipFill>
-        <p:spPr>
-          <a:xfrm>
-            <a:off x="194820" y="2664643"/>
-            <a:ext cx="3271101" cy="3710438"/>
-          </a:xfrm>
-          <a:prstGeom prst="rect">
-            <a:avLst/>
-          </a:prstGeom>
-          <a:ln>
-            <a:noFill/>
-          </a:ln>
-          <a:effectLst>
-            <a:reflection blurRad="12700" stA="30000" endPos="30000" dist="5000" dir="5400000" sy="-100000" algn="bl" rotWithShape="0"/>
-          </a:effectLst>
-          <a:scene3d>
-            <a:camera prst="perspectiveContrastingLeftFacing">
-              <a:rot lat="300000" lon="19800000" rev="0"/>
-            </a:camera>
-            <a:lightRig rig="threePt" dir="t">
-              <a:rot lat="0" lon="0" rev="2700000"/>
-            </a:lightRig>
-          </a:scene3d>
-          <a:sp3d>
-            <a:bevelT w="63500" h="50800"/>
-          </a:sp3d>
-        </p:spPr>
-      </p:pic>
-      <p:sp>
-        <p:nvSpPr>
-          <p:cNvPr id="10" name="スマイル 9">
-            <a:extLst>
-              <a:ext uri="{FF2B5EF4-FFF2-40B4-BE49-F238E27FC236}">
-                <a16:creationId xmlns:a16="http://schemas.microsoft.com/office/drawing/2014/main" id="{62E19BDF-9EE7-93B1-0DAB-FD4FCB2553DD}"/>
-              </a:ext>
-            </a:extLst>
-          </p:cNvPr>
-          <p:cNvSpPr/>
-          <p:nvPr/>
-        </p:nvSpPr>
-        <p:spPr>
-          <a:xfrm rot="2761819">
-            <a:off x="8259424" y="5152620"/>
-            <a:ext cx="1680754" cy="1480457"/>
-          </a:xfrm>
-          <a:prstGeom prst="smileyFace">
-            <a:avLst/>
-          </a:prstGeom>
-          <a:solidFill>
-            <a:srgbClr val="FFFF00"/>
-          </a:solidFill>
-          <a:effectLst>
-            <a:outerShdw blurRad="50800" dist="38100" dir="2700000" algn="tl" rotWithShape="0">
-              <a:prstClr val="black">
-                <a:alpha val="40000"/>
-              </a:prstClr>
-            </a:outerShdw>
-          </a:effectLst>
-        </p:spPr>
-        <p:style>
-          <a:lnRef idx="2">
-            <a:schemeClr val="accent1">
-              <a:shade val="15000"/>
-            </a:schemeClr>
-          </a:lnRef>
-          <a:fillRef idx="1">
-            <a:schemeClr val="accent1"/>
-          </a:fillRef>
-          <a:effectRef idx="0">
-            <a:schemeClr val="accent1"/>
-          </a:effectRef>
-          <a:fontRef idx="minor">
-            <a:schemeClr val="lt1"/>
-          </a:fontRef>
-        </p:style>
-        <p:txBody>
-          <a:bodyPr rtlCol="0" anchor="ctr"/>
-          <a:lstStyle/>
-          <a:p>
-            <a:pPr algn="ctr"/>
-            <a:endParaRPr kumimoji="1" lang="ja-JP" altLang="en-US"/>
-          </a:p>
-        </p:txBody>
-      </p:sp>
-      <p:sp>
-        <p:nvSpPr>
-          <p:cNvPr id="11" name="スマイル 10">
-            <a:extLst>
-              <a:ext uri="{FF2B5EF4-FFF2-40B4-BE49-F238E27FC236}">
-                <a16:creationId xmlns:a16="http://schemas.microsoft.com/office/drawing/2014/main" id="{B34E26D0-0E3C-6852-0F00-30DC6B81C680}"/>
-              </a:ext>
-            </a:extLst>
-          </p:cNvPr>
-          <p:cNvSpPr/>
-          <p:nvPr/>
-        </p:nvSpPr>
-        <p:spPr>
-          <a:xfrm rot="10800000">
-            <a:off x="9341528" y="3848341"/>
-            <a:ext cx="1680754" cy="1480457"/>
-          </a:xfrm>
-          <a:prstGeom prst="smileyFace">
-            <a:avLst/>
-          </a:prstGeom>
-          <a:solidFill>
-            <a:srgbClr val="FFFF00"/>
-          </a:solidFill>
-          <a:effectLst>
-            <a:outerShdw blurRad="50800" dist="38100" dir="2700000" algn="tl" rotWithShape="0">
-              <a:prstClr val="black">
-                <a:alpha val="40000"/>
-              </a:prstClr>
-            </a:outerShdw>
-          </a:effectLst>
-        </p:spPr>
-        <p:style>
-          <a:lnRef idx="2">
-            <a:schemeClr val="accent1">
-              <a:shade val="15000"/>
-            </a:schemeClr>
-          </a:lnRef>
-          <a:fillRef idx="1">
-            <a:schemeClr val="accent1"/>
-          </a:fillRef>
-          <a:effectRef idx="0">
-            <a:schemeClr val="accent1"/>
-          </a:effectRef>
-          <a:fontRef idx="minor">
-            <a:schemeClr val="lt1"/>
-          </a:fontRef>
-        </p:style>
-        <p:txBody>
-          <a:bodyPr rtlCol="0" anchor="ctr"/>
-          <a:lstStyle/>
-          <a:p>
-            <a:pPr algn="ctr"/>
-            <a:endParaRPr kumimoji="1" lang="ja-JP" altLang="en-US" dirty="0"/>
-          </a:p>
-        </p:txBody>
-      </p:sp>
-      <p:sp>
-        <p:nvSpPr>
-          <p:cNvPr id="13" name="稲妻 12">
-            <a:extLst>
-              <a:ext uri="{FF2B5EF4-FFF2-40B4-BE49-F238E27FC236}">
-                <a16:creationId xmlns:a16="http://schemas.microsoft.com/office/drawing/2014/main" id="{3E863D6E-D805-E4FC-D90F-44E503673C0C}"/>
-              </a:ext>
-            </a:extLst>
-          </p:cNvPr>
-          <p:cNvSpPr/>
-          <p:nvPr/>
-        </p:nvSpPr>
-        <p:spPr>
-          <a:xfrm>
-            <a:off x="1219166" y="21615"/>
-            <a:ext cx="1222408" cy="2175309"/>
-          </a:xfrm>
-          <a:prstGeom prst="lightningBolt">
-            <a:avLst/>
-          </a:prstGeom>
-          <a:solidFill>
-            <a:schemeClr val="accent5"/>
-          </a:solidFill>
-        </p:spPr>
-        <p:style>
-          <a:lnRef idx="2">
-            <a:schemeClr val="accent1">
-              <a:shade val="15000"/>
-            </a:schemeClr>
-          </a:lnRef>
-          <a:fillRef idx="1">
-            <a:schemeClr val="accent1"/>
-          </a:fillRef>
-          <a:effectRef idx="0">
-            <a:schemeClr val="accent1"/>
-          </a:effectRef>
-          <a:fontRef idx="minor">
-            <a:schemeClr val="lt1"/>
-          </a:fontRef>
-        </p:style>
-        <p:txBody>
-          <a:bodyPr rtlCol="0" anchor="ctr"/>
-          <a:lstStyle/>
-          <a:p>
-            <a:pPr algn="ctr"/>
-            <a:endParaRPr lang="ja-JP" altLang="en-US"/>
-          </a:p>
-        </p:txBody>
-      </p:sp>
-      <p:sp>
-        <p:nvSpPr>
-          <p:cNvPr id="14" name="稲妻 13">
-            <a:extLst>
-              <a:ext uri="{FF2B5EF4-FFF2-40B4-BE49-F238E27FC236}">
-                <a16:creationId xmlns:a16="http://schemas.microsoft.com/office/drawing/2014/main" id="{AB80AE40-809F-3520-C7A4-7325E532BB8F}"/>
-              </a:ext>
-            </a:extLst>
-          </p:cNvPr>
-          <p:cNvSpPr/>
-          <p:nvPr/>
-        </p:nvSpPr>
-        <p:spPr>
-          <a:xfrm flipH="1">
-            <a:off x="9445592" y="220431"/>
-            <a:ext cx="1222408" cy="2175309"/>
-          </a:xfrm>
-          <a:prstGeom prst="lightningBolt">
-            <a:avLst/>
-          </a:prstGeom>
-          <a:solidFill>
-            <a:srgbClr val="FF0000"/>
-          </a:solidFill>
-        </p:spPr>
-        <p:style>
-          <a:lnRef idx="2">
-            <a:schemeClr val="accent1">
-              <a:shade val="15000"/>
-            </a:schemeClr>
-          </a:lnRef>
-          <a:fillRef idx="1">
-            <a:schemeClr val="accent1"/>
-          </a:fillRef>
-          <a:effectRef idx="0">
-            <a:schemeClr val="accent1"/>
-          </a:effectRef>
-          <a:fontRef idx="minor">
-            <a:schemeClr val="lt1"/>
-          </a:fontRef>
-        </p:style>
-        <p:txBody>
-          <a:bodyPr rtlCol="0" anchor="ctr"/>
-          <a:lstStyle/>
-          <a:p>
-            <a:pPr algn="ctr"/>
-            <a:endParaRPr kumimoji="1" lang="ja-JP" altLang="en-US"/>
           </a:p>
         </p:txBody>
       </p:sp>
@@ -4406,7 +4063,7 @@
 <file path=ppt/theme/theme1.xml><?xml version="1.0" encoding="utf-8"?>
 <a:theme xmlns:a="http://schemas.openxmlformats.org/drawingml/2006/main" name="Office テーマ">
   <a:themeElements>
-    <a:clrScheme name="Office">
+    <a:clrScheme name="Office テーマ">
       <a:dk1>
         <a:sysClr val="windowText" lastClr="000000"/>
       </a:dk1>
@@ -4444,9 +4101,9 @@
         <a:srgbClr val="96607D"/>
       </a:folHlink>
     </a:clrScheme>
-    <a:fontScheme name="Office">
+    <a:fontScheme name="Office テーマ">
       <a:majorFont>
-        <a:latin typeface="游ゴシック Light" panose="02110004020202020204"/>
+        <a:latin typeface="Aptos Display" panose="02110004020202020204"/>
         <a:ea typeface=""/>
         <a:cs typeface=""/>
         <a:font script="Jpan" typeface="游ゴシック Light"/>
@@ -4498,7 +4155,7 @@
         <a:font script="Tfng" typeface="Ebrima"/>
       </a:majorFont>
       <a:minorFont>
-        <a:latin typeface="游ゴシック" panose="02110004020202020204"/>
+        <a:latin typeface="Aptos" panose="02110004020202020204"/>
         <a:ea typeface=""/>
         <a:cs typeface=""/>
         <a:font script="Jpan" typeface="游ゴシック"/>
@@ -4550,7 +4207,7 @@
         <a:font script="Tfng" typeface="Ebrima"/>
       </a:minorFont>
     </a:fontScheme>
-    <a:fmtScheme name="Office">
+    <a:fmtScheme name="Office テーマ">
       <a:fillStyleLst>
         <a:solidFill>
           <a:schemeClr val="phClr"/>

</xml_diff>